<commit_message>
Small additions to presentation
</commit_message>
<xml_diff>
--- a/PostgREST2019_Workshop.pptx
+++ b/PostgREST2019_Workshop.pptx
@@ -5,7 +5,7 @@
     <p:sldMasterId id="2147483660" r:id="rId1"/>
   </p:sldMasterIdLst>
   <p:notesMasterIdLst>
-    <p:notesMasterId r:id="rId23"/>
+    <p:notesMasterId r:id="rId25"/>
   </p:notesMasterIdLst>
   <p:sldIdLst>
     <p:sldId id="256" r:id="rId2"/>
@@ -13,22 +13,24 @@
     <p:sldId id="260" r:id="rId4"/>
     <p:sldId id="261" r:id="rId5"/>
     <p:sldId id="257" r:id="rId6"/>
-    <p:sldId id="263" r:id="rId7"/>
-    <p:sldId id="264" r:id="rId8"/>
-    <p:sldId id="266" r:id="rId9"/>
-    <p:sldId id="258" r:id="rId10"/>
-    <p:sldId id="259" r:id="rId11"/>
-    <p:sldId id="265" r:id="rId12"/>
-    <p:sldId id="267" r:id="rId13"/>
-    <p:sldId id="268" r:id="rId14"/>
-    <p:sldId id="269" r:id="rId15"/>
-    <p:sldId id="270" r:id="rId16"/>
-    <p:sldId id="271" r:id="rId17"/>
-    <p:sldId id="272" r:id="rId18"/>
-    <p:sldId id="273" r:id="rId19"/>
-    <p:sldId id="274" r:id="rId20"/>
-    <p:sldId id="275" r:id="rId21"/>
-    <p:sldId id="276" r:id="rId22"/>
+    <p:sldId id="277" r:id="rId7"/>
+    <p:sldId id="263" r:id="rId8"/>
+    <p:sldId id="264" r:id="rId9"/>
+    <p:sldId id="266" r:id="rId10"/>
+    <p:sldId id="258" r:id="rId11"/>
+    <p:sldId id="259" r:id="rId12"/>
+    <p:sldId id="265" r:id="rId13"/>
+    <p:sldId id="267" r:id="rId14"/>
+    <p:sldId id="268" r:id="rId15"/>
+    <p:sldId id="269" r:id="rId16"/>
+    <p:sldId id="270" r:id="rId17"/>
+    <p:sldId id="271" r:id="rId18"/>
+    <p:sldId id="272" r:id="rId19"/>
+    <p:sldId id="273" r:id="rId20"/>
+    <p:sldId id="274" r:id="rId21"/>
+    <p:sldId id="275" r:id="rId22"/>
+    <p:sldId id="278" r:id="rId23"/>
+    <p:sldId id="276" r:id="rId24"/>
   </p:sldIdLst>
   <p:sldSz cx="12192000" cy="6858000"/>
   <p:notesSz cx="6858000" cy="9144000"/>
@@ -127,6 +129,11 @@
       </a:defRPr>
     </a:lvl9pPr>
   </p:defaultTextStyle>
+  <p:extLst>
+    <p:ext uri="{EFAFB233-063F-42B5-8137-9DF3F51BA10A}">
+      <p15:sldGuideLst xmlns:p15="http://schemas.microsoft.com/office/powerpoint/2012/main"/>
+    </p:ext>
+  </p:extLst>
 </p:presentation>
 </file>
 
@@ -212,7 +219,7 @@
           <a:p>
             <a:fld id="{BC14CD0C-8395-460C-962C-E5A24F71D72A}" type="datetimeFigureOut">
               <a:rPr lang="de-DE" smtClean="0"/>
-              <a:t>17.12.2019</a:t>
+              <a:t>18.12.2019</a:t>
             </a:fld>
             <a:endParaRPr lang="de-DE"/>
           </a:p>
@@ -816,7 +823,7 @@
     </p:spTree>
     <p:extLst>
       <p:ext uri="{BB962C8B-B14F-4D97-AF65-F5344CB8AC3E}">
-        <p14:creationId xmlns:p14="http://schemas.microsoft.com/office/powerpoint/2010/main" val="1475885031"/>
+        <p14:creationId xmlns:p14="http://schemas.microsoft.com/office/powerpoint/2010/main" val="1522675696"/>
       </p:ext>
     </p:extLst>
   </p:cSld>
@@ -1024,7 +1031,7 @@
     </p:spTree>
     <p:extLst>
       <p:ext uri="{BB962C8B-B14F-4D97-AF65-F5344CB8AC3E}">
-        <p14:creationId xmlns:p14="http://schemas.microsoft.com/office/powerpoint/2010/main" val="2291558605"/>
+        <p14:creationId xmlns:p14="http://schemas.microsoft.com/office/powerpoint/2010/main" val="1475885031"/>
       </p:ext>
     </p:extLst>
   </p:cSld>
@@ -1232,7 +1239,7 @@
     </p:spTree>
     <p:extLst>
       <p:ext uri="{BB962C8B-B14F-4D97-AF65-F5344CB8AC3E}">
-        <p14:creationId xmlns:p14="http://schemas.microsoft.com/office/powerpoint/2010/main" val="824582188"/>
+        <p14:creationId xmlns:p14="http://schemas.microsoft.com/office/powerpoint/2010/main" val="2291558605"/>
       </p:ext>
     </p:extLst>
   </p:cSld>
@@ -1440,7 +1447,7 @@
     </p:spTree>
     <p:extLst>
       <p:ext uri="{BB962C8B-B14F-4D97-AF65-F5344CB8AC3E}">
-        <p14:creationId xmlns:p14="http://schemas.microsoft.com/office/powerpoint/2010/main" val="1175707612"/>
+        <p14:creationId xmlns:p14="http://schemas.microsoft.com/office/powerpoint/2010/main" val="824582188"/>
       </p:ext>
     </p:extLst>
   </p:cSld>
@@ -1648,7 +1655,7 @@
     </p:spTree>
     <p:extLst>
       <p:ext uri="{BB962C8B-B14F-4D97-AF65-F5344CB8AC3E}">
-        <p14:creationId xmlns:p14="http://schemas.microsoft.com/office/powerpoint/2010/main" val="2462082733"/>
+        <p14:creationId xmlns:p14="http://schemas.microsoft.com/office/powerpoint/2010/main" val="1175707612"/>
       </p:ext>
     </p:extLst>
   </p:cSld>
@@ -1856,7 +1863,7 @@
     </p:spTree>
     <p:extLst>
       <p:ext uri="{BB962C8B-B14F-4D97-AF65-F5344CB8AC3E}">
-        <p14:creationId xmlns:p14="http://schemas.microsoft.com/office/powerpoint/2010/main" val="3310375175"/>
+        <p14:creationId xmlns:p14="http://schemas.microsoft.com/office/powerpoint/2010/main" val="2462082733"/>
       </p:ext>
     </p:extLst>
   </p:cSld>
@@ -2064,7 +2071,7 @@
     </p:spTree>
     <p:extLst>
       <p:ext uri="{BB962C8B-B14F-4D97-AF65-F5344CB8AC3E}">
-        <p14:creationId xmlns:p14="http://schemas.microsoft.com/office/powerpoint/2010/main" val="930923693"/>
+        <p14:creationId xmlns:p14="http://schemas.microsoft.com/office/powerpoint/2010/main" val="3310375175"/>
       </p:ext>
     </p:extLst>
   </p:cSld>
@@ -2272,7 +2279,7 @@
     </p:spTree>
     <p:extLst>
       <p:ext uri="{BB962C8B-B14F-4D97-AF65-F5344CB8AC3E}">
-        <p14:creationId xmlns:p14="http://schemas.microsoft.com/office/powerpoint/2010/main" val="1427622335"/>
+        <p14:creationId xmlns:p14="http://schemas.microsoft.com/office/powerpoint/2010/main" val="930923693"/>
       </p:ext>
     </p:extLst>
   </p:cSld>
@@ -2480,7 +2487,7 @@
     </p:spTree>
     <p:extLst>
       <p:ext uri="{BB962C8B-B14F-4D97-AF65-F5344CB8AC3E}">
-        <p14:creationId xmlns:p14="http://schemas.microsoft.com/office/powerpoint/2010/main" val="1136676306"/>
+        <p14:creationId xmlns:p14="http://schemas.microsoft.com/office/powerpoint/2010/main" val="1427622335"/>
       </p:ext>
     </p:extLst>
   </p:cSld>
@@ -2688,7 +2695,7 @@
     </p:spTree>
     <p:extLst>
       <p:ext uri="{BB962C8B-B14F-4D97-AF65-F5344CB8AC3E}">
-        <p14:creationId xmlns:p14="http://schemas.microsoft.com/office/powerpoint/2010/main" val="2629159085"/>
+        <p14:creationId xmlns:p14="http://schemas.microsoft.com/office/powerpoint/2010/main" val="1136676306"/>
       </p:ext>
     </p:extLst>
   </p:cSld>
@@ -2828,6 +2835,422 @@
     <p:extLst>
       <p:ext uri="{BB962C8B-B14F-4D97-AF65-F5344CB8AC3E}">
         <p14:creationId xmlns:p14="http://schemas.microsoft.com/office/powerpoint/2010/main" val="3428629588"/>
+      </p:ext>
+    </p:extLst>
+  </p:cSld>
+  <p:clrMapOvr>
+    <a:masterClrMapping/>
+  </p:clrMapOvr>
+</p:notes>
+</file>
+
+<file path=ppt/notesSlides/notesSlide20.xml><?xml version="1.0" encoding="utf-8"?>
+<p:notes xmlns:a="http://schemas.openxmlformats.org/drawingml/2006/main" xmlns:r="http://schemas.openxmlformats.org/officeDocument/2006/relationships" xmlns:p="http://schemas.openxmlformats.org/presentationml/2006/main">
+  <p:cSld>
+    <p:spTree>
+      <p:nvGrpSpPr>
+        <p:cNvPr id="1" name=""/>
+        <p:cNvGrpSpPr/>
+        <p:nvPr/>
+      </p:nvGrpSpPr>
+      <p:grpSpPr>
+        <a:xfrm>
+          <a:off x="0" y="0"/>
+          <a:ext cx="0" cy="0"/>
+          <a:chOff x="0" y="0"/>
+          <a:chExt cx="0" cy="0"/>
+        </a:xfrm>
+      </p:grpSpPr>
+      <p:sp>
+        <p:nvSpPr>
+          <p:cNvPr id="2" name="Folienbildplatzhalter 1"/>
+          <p:cNvSpPr>
+            <a:spLocks noGrp="1" noRot="1" noChangeAspect="1"/>
+          </p:cNvSpPr>
+          <p:nvPr>
+            <p:ph type="sldImg"/>
+          </p:nvPr>
+        </p:nvSpPr>
+        <p:spPr/>
+      </p:sp>
+      <p:sp>
+        <p:nvSpPr>
+          <p:cNvPr id="3" name="Notizenplatzhalter 2"/>
+          <p:cNvSpPr>
+            <a:spLocks noGrp="1"/>
+          </p:cNvSpPr>
+          <p:nvPr>
+            <p:ph type="body" idx="1"/>
+          </p:nvPr>
+        </p:nvSpPr>
+        <p:spPr/>
+        <p:txBody>
+          <a:bodyPr/>
+          <a:lstStyle/>
+          <a:p>
+            <a:r>
+              <a:rPr lang="de-DE" dirty="0" err="1"/>
+              <a:t>To</a:t>
+            </a:r>
+            <a:r>
+              <a:rPr lang="de-DE" dirty="0"/>
+              <a:t> </a:t>
+            </a:r>
+            <a:r>
+              <a:rPr lang="de-DE" dirty="0" err="1"/>
+              <a:t>allow</a:t>
+            </a:r>
+            <a:r>
+              <a:rPr lang="de-DE" dirty="0"/>
+              <a:t> </a:t>
+            </a:r>
+            <a:r>
+              <a:rPr lang="de-DE" dirty="0" err="1"/>
+              <a:t>the</a:t>
+            </a:r>
+            <a:r>
+              <a:rPr lang="de-DE" dirty="0"/>
+              <a:t> </a:t>
+            </a:r>
+            <a:r>
+              <a:rPr lang="de-DE" dirty="0" err="1"/>
+              <a:t>authenticator</a:t>
+            </a:r>
+            <a:r>
+              <a:rPr lang="de-DE" dirty="0"/>
+              <a:t> </a:t>
+            </a:r>
+            <a:r>
+              <a:rPr lang="de-DE" dirty="0" err="1"/>
+              <a:t>to</a:t>
+            </a:r>
+            <a:r>
+              <a:rPr lang="de-DE" dirty="0"/>
+              <a:t> switch </a:t>
+            </a:r>
+            <a:r>
+              <a:rPr lang="de-DE" dirty="0" err="1"/>
+              <a:t>to</a:t>
+            </a:r>
+            <a:r>
+              <a:rPr lang="de-DE" dirty="0"/>
+              <a:t> a </a:t>
+            </a:r>
+            <a:r>
+              <a:rPr lang="de-DE" dirty="0" err="1"/>
+              <a:t>role</a:t>
+            </a:r>
+            <a:r>
+              <a:rPr lang="de-DE" dirty="0"/>
+              <a:t> </a:t>
+            </a:r>
+            <a:r>
+              <a:rPr lang="de-DE" dirty="0" err="1"/>
+              <a:t>it</a:t>
+            </a:r>
+            <a:r>
+              <a:rPr lang="de-DE" dirty="0"/>
+              <a:t> </a:t>
+            </a:r>
+            <a:r>
+              <a:rPr lang="de-DE" dirty="0" err="1"/>
+              <a:t>needs</a:t>
+            </a:r>
+            <a:r>
+              <a:rPr lang="de-DE" dirty="0"/>
+              <a:t> </a:t>
+            </a:r>
+            <a:r>
+              <a:rPr lang="de-DE" dirty="0" err="1"/>
+              <a:t>to</a:t>
+            </a:r>
+            <a:r>
+              <a:rPr lang="de-DE" dirty="0"/>
+              <a:t> </a:t>
+            </a:r>
+            <a:r>
+              <a:rPr lang="de-DE" dirty="0" err="1"/>
+              <a:t>be</a:t>
+            </a:r>
+            <a:r>
+              <a:rPr lang="de-DE" dirty="0"/>
+              <a:t> </a:t>
+            </a:r>
+            <a:r>
+              <a:rPr lang="de-DE" dirty="0" err="1"/>
+              <a:t>configured</a:t>
+            </a:r>
+            <a:r>
+              <a:rPr lang="de-DE" dirty="0"/>
+              <a:t> </a:t>
+            </a:r>
+            <a:r>
+              <a:rPr lang="de-DE" dirty="0" err="1"/>
+              <a:t>by</a:t>
+            </a:r>
+            <a:r>
+              <a:rPr lang="de-DE" dirty="0"/>
+              <a:t> </a:t>
+            </a:r>
+            <a:r>
+              <a:rPr lang="de-DE" dirty="0" err="1"/>
+              <a:t>the</a:t>
+            </a:r>
+            <a:r>
+              <a:rPr lang="de-DE" dirty="0"/>
+              <a:t> </a:t>
+            </a:r>
+            <a:r>
+              <a:rPr lang="de-DE" dirty="0" err="1"/>
+              <a:t>datbase</a:t>
+            </a:r>
+            <a:r>
+              <a:rPr lang="de-DE" dirty="0"/>
+              <a:t> </a:t>
+            </a:r>
+            <a:r>
+              <a:rPr lang="de-DE" dirty="0" err="1"/>
+              <a:t>administrator</a:t>
+            </a:r>
+            <a:endParaRPr lang="de-DE" dirty="0"/>
+          </a:p>
+        </p:txBody>
+      </p:sp>
+      <p:sp>
+        <p:nvSpPr>
+          <p:cNvPr id="4" name="Foliennummernplatzhalter 3"/>
+          <p:cNvSpPr>
+            <a:spLocks noGrp="1"/>
+          </p:cNvSpPr>
+          <p:nvPr>
+            <p:ph type="sldNum" sz="quarter" idx="5"/>
+          </p:nvPr>
+        </p:nvSpPr>
+        <p:spPr/>
+        <p:txBody>
+          <a:bodyPr/>
+          <a:lstStyle/>
+          <a:p>
+            <a:fld id="{7E94FB3A-7DAB-43ED-A5FC-F75D35A24F78}" type="slidenum">
+              <a:rPr lang="de-DE" smtClean="0"/>
+              <a:t>21</a:t>
+            </a:fld>
+            <a:endParaRPr lang="de-DE"/>
+          </a:p>
+        </p:txBody>
+      </p:sp>
+    </p:spTree>
+    <p:extLst>
+      <p:ext uri="{BB962C8B-B14F-4D97-AF65-F5344CB8AC3E}">
+        <p14:creationId xmlns:p14="http://schemas.microsoft.com/office/powerpoint/2010/main" val="2629159085"/>
+      </p:ext>
+    </p:extLst>
+  </p:cSld>
+  <p:clrMapOvr>
+    <a:masterClrMapping/>
+  </p:clrMapOvr>
+</p:notes>
+</file>
+
+<file path=ppt/notesSlides/notesSlide21.xml><?xml version="1.0" encoding="utf-8"?>
+<p:notes xmlns:a="http://schemas.openxmlformats.org/drawingml/2006/main" xmlns:r="http://schemas.openxmlformats.org/officeDocument/2006/relationships" xmlns:p="http://schemas.openxmlformats.org/presentationml/2006/main">
+  <p:cSld>
+    <p:spTree>
+      <p:nvGrpSpPr>
+        <p:cNvPr id="1" name=""/>
+        <p:cNvGrpSpPr/>
+        <p:nvPr/>
+      </p:nvGrpSpPr>
+      <p:grpSpPr>
+        <a:xfrm>
+          <a:off x="0" y="0"/>
+          <a:ext cx="0" cy="0"/>
+          <a:chOff x="0" y="0"/>
+          <a:chExt cx="0" cy="0"/>
+        </a:xfrm>
+      </p:grpSpPr>
+      <p:sp>
+        <p:nvSpPr>
+          <p:cNvPr id="2" name="Folienbildplatzhalter 1"/>
+          <p:cNvSpPr>
+            <a:spLocks noGrp="1" noRot="1" noChangeAspect="1"/>
+          </p:cNvSpPr>
+          <p:nvPr>
+            <p:ph type="sldImg"/>
+          </p:nvPr>
+        </p:nvSpPr>
+        <p:spPr/>
+      </p:sp>
+      <p:sp>
+        <p:nvSpPr>
+          <p:cNvPr id="3" name="Notizenplatzhalter 2"/>
+          <p:cNvSpPr>
+            <a:spLocks noGrp="1"/>
+          </p:cNvSpPr>
+          <p:nvPr>
+            <p:ph type="body" idx="1"/>
+          </p:nvPr>
+        </p:nvSpPr>
+        <p:spPr/>
+        <p:txBody>
+          <a:bodyPr/>
+          <a:lstStyle/>
+          <a:p>
+            <a:r>
+              <a:rPr lang="de-DE" dirty="0" err="1"/>
+              <a:t>To</a:t>
+            </a:r>
+            <a:r>
+              <a:rPr lang="de-DE" dirty="0"/>
+              <a:t> </a:t>
+            </a:r>
+            <a:r>
+              <a:rPr lang="de-DE" dirty="0" err="1"/>
+              <a:t>allow</a:t>
+            </a:r>
+            <a:r>
+              <a:rPr lang="de-DE" dirty="0"/>
+              <a:t> </a:t>
+            </a:r>
+            <a:r>
+              <a:rPr lang="de-DE" dirty="0" err="1"/>
+              <a:t>the</a:t>
+            </a:r>
+            <a:r>
+              <a:rPr lang="de-DE" dirty="0"/>
+              <a:t> </a:t>
+            </a:r>
+            <a:r>
+              <a:rPr lang="de-DE" dirty="0" err="1"/>
+              <a:t>authenticator</a:t>
+            </a:r>
+            <a:r>
+              <a:rPr lang="de-DE" dirty="0"/>
+              <a:t> </a:t>
+            </a:r>
+            <a:r>
+              <a:rPr lang="de-DE" dirty="0" err="1"/>
+              <a:t>to</a:t>
+            </a:r>
+            <a:r>
+              <a:rPr lang="de-DE" dirty="0"/>
+              <a:t> switch </a:t>
+            </a:r>
+            <a:r>
+              <a:rPr lang="de-DE" dirty="0" err="1"/>
+              <a:t>to</a:t>
+            </a:r>
+            <a:r>
+              <a:rPr lang="de-DE" dirty="0"/>
+              <a:t> a </a:t>
+            </a:r>
+            <a:r>
+              <a:rPr lang="de-DE" dirty="0" err="1"/>
+              <a:t>role</a:t>
+            </a:r>
+            <a:r>
+              <a:rPr lang="de-DE" dirty="0"/>
+              <a:t> </a:t>
+            </a:r>
+            <a:r>
+              <a:rPr lang="de-DE" dirty="0" err="1"/>
+              <a:t>it</a:t>
+            </a:r>
+            <a:r>
+              <a:rPr lang="de-DE" dirty="0"/>
+              <a:t> </a:t>
+            </a:r>
+            <a:r>
+              <a:rPr lang="de-DE" dirty="0" err="1"/>
+              <a:t>needs</a:t>
+            </a:r>
+            <a:r>
+              <a:rPr lang="de-DE" dirty="0"/>
+              <a:t> </a:t>
+            </a:r>
+            <a:r>
+              <a:rPr lang="de-DE" dirty="0" err="1"/>
+              <a:t>to</a:t>
+            </a:r>
+            <a:r>
+              <a:rPr lang="de-DE" dirty="0"/>
+              <a:t> </a:t>
+            </a:r>
+            <a:r>
+              <a:rPr lang="de-DE" dirty="0" err="1"/>
+              <a:t>be</a:t>
+            </a:r>
+            <a:r>
+              <a:rPr lang="de-DE" dirty="0"/>
+              <a:t> </a:t>
+            </a:r>
+            <a:r>
+              <a:rPr lang="de-DE" dirty="0" err="1"/>
+              <a:t>configured</a:t>
+            </a:r>
+            <a:r>
+              <a:rPr lang="de-DE" dirty="0"/>
+              <a:t> </a:t>
+            </a:r>
+            <a:r>
+              <a:rPr lang="de-DE" dirty="0" err="1"/>
+              <a:t>by</a:t>
+            </a:r>
+            <a:r>
+              <a:rPr lang="de-DE" dirty="0"/>
+              <a:t> </a:t>
+            </a:r>
+            <a:r>
+              <a:rPr lang="de-DE" dirty="0" err="1"/>
+              <a:t>the</a:t>
+            </a:r>
+            <a:r>
+              <a:rPr lang="de-DE" dirty="0"/>
+              <a:t> </a:t>
+            </a:r>
+            <a:r>
+              <a:rPr lang="de-DE" dirty="0" err="1"/>
+              <a:t>datbase</a:t>
+            </a:r>
+            <a:r>
+              <a:rPr lang="de-DE" dirty="0"/>
+              <a:t> </a:t>
+            </a:r>
+            <a:r>
+              <a:rPr lang="de-DE" dirty="0" err="1"/>
+              <a:t>administrator</a:t>
+            </a:r>
+            <a:endParaRPr lang="de-DE" dirty="0"/>
+          </a:p>
+        </p:txBody>
+      </p:sp>
+      <p:sp>
+        <p:nvSpPr>
+          <p:cNvPr id="4" name="Foliennummernplatzhalter 3"/>
+          <p:cNvSpPr>
+            <a:spLocks noGrp="1"/>
+          </p:cNvSpPr>
+          <p:nvPr>
+            <p:ph type="sldNum" sz="quarter" idx="5"/>
+          </p:nvPr>
+        </p:nvSpPr>
+        <p:spPr/>
+        <p:txBody>
+          <a:bodyPr/>
+          <a:lstStyle/>
+          <a:p>
+            <a:fld id="{7E94FB3A-7DAB-43ED-A5FC-F75D35A24F78}" type="slidenum">
+              <a:rPr lang="de-DE" smtClean="0"/>
+              <a:t>22</a:t>
+            </a:fld>
+            <a:endParaRPr lang="de-DE"/>
+          </a:p>
+        </p:txBody>
+      </p:sp>
+    </p:spTree>
+    <p:extLst>
+      <p:ext uri="{BB962C8B-B14F-4D97-AF65-F5344CB8AC3E}">
+        <p14:creationId xmlns:p14="http://schemas.microsoft.com/office/powerpoint/2010/main" val="2091422487"/>
       </p:ext>
     </p:extLst>
   </p:cSld>
@@ -3244,7 +3667,7 @@
     </p:spTree>
     <p:extLst>
       <p:ext uri="{BB962C8B-B14F-4D97-AF65-F5344CB8AC3E}">
-        <p14:creationId xmlns:p14="http://schemas.microsoft.com/office/powerpoint/2010/main" val="2663309437"/>
+        <p14:creationId xmlns:p14="http://schemas.microsoft.com/office/powerpoint/2010/main" val="1497050340"/>
       </p:ext>
     </p:extLst>
   </p:cSld>
@@ -3299,8 +3722,36 @@
           <a:lstStyle/>
           <a:p>
             <a:r>
-              <a:rPr lang="de-DE" dirty="0"/>
-              <a:t>A </a:t>
+              <a:rPr lang="de-DE" dirty="0" err="1"/>
+              <a:t>Standalone</a:t>
+            </a:r>
+            <a:r>
+              <a:rPr lang="de-DE" dirty="0"/>
+              <a:t> </a:t>
+            </a:r>
+            <a:r>
+              <a:rPr lang="de-DE" dirty="0" err="1"/>
+              <a:t>webserver</a:t>
+            </a:r>
+            <a:r>
+              <a:rPr lang="de-DE" dirty="0"/>
+              <a:t> </a:t>
+            </a:r>
+            <a:r>
+              <a:rPr lang="de-DE" dirty="0" err="1"/>
+              <a:t>that</a:t>
+            </a:r>
+            <a:r>
+              <a:rPr lang="de-DE" dirty="0"/>
+              <a:t> </a:t>
+            </a:r>
+            <a:r>
+              <a:rPr lang="de-DE" dirty="0" err="1"/>
+              <a:t>turns</a:t>
+            </a:r>
+            <a:r>
+              <a:rPr lang="de-DE" dirty="0"/>
+              <a:t> a PostgreSQL </a:t>
             </a:r>
             <a:r>
               <a:rPr lang="de-DE" dirty="0" err="1"/>
@@ -3312,153 +3763,20 @@
             </a:r>
             <a:r>
               <a:rPr lang="de-DE" dirty="0" err="1"/>
-              <a:t>can</a:t>
-            </a:r>
-            <a:r>
-              <a:rPr lang="de-DE" dirty="0"/>
-              <a:t> </a:t>
-            </a:r>
-            <a:r>
-              <a:rPr lang="de-DE" dirty="0" err="1"/>
-              <a:t>contain</a:t>
-            </a:r>
-            <a:r>
-              <a:rPr lang="de-DE" dirty="0"/>
-              <a:t> </a:t>
-            </a:r>
-            <a:r>
-              <a:rPr lang="de-DE" dirty="0" err="1"/>
-              <a:t>one</a:t>
-            </a:r>
-            <a:r>
-              <a:rPr lang="de-DE" dirty="0"/>
-              <a:t> </a:t>
-            </a:r>
-            <a:r>
-              <a:rPr lang="de-DE" dirty="0" err="1"/>
-              <a:t>or</a:t>
-            </a:r>
-            <a:r>
-              <a:rPr lang="de-DE" dirty="0"/>
-              <a:t> multiple </a:t>
-            </a:r>
-            <a:r>
-              <a:rPr lang="de-DE" dirty="0" err="1"/>
-              <a:t>schemas</a:t>
-            </a:r>
-            <a:r>
-              <a:rPr lang="de-DE" dirty="0"/>
-              <a:t> </a:t>
-            </a:r>
-            <a:r>
-              <a:rPr lang="de-DE" dirty="0" err="1"/>
-              <a:t>which</a:t>
-            </a:r>
-            <a:r>
-              <a:rPr lang="de-DE" dirty="0"/>
-              <a:t> in turn </a:t>
-            </a:r>
-            <a:r>
-              <a:rPr lang="de-DE" dirty="0" err="1"/>
-              <a:t>can</a:t>
-            </a:r>
-            <a:r>
-              <a:rPr lang="de-DE" dirty="0"/>
-              <a:t> hold multiple </a:t>
-            </a:r>
-            <a:r>
-              <a:rPr lang="de-DE" dirty="0" err="1"/>
-              <a:t>tables</a:t>
-            </a:r>
-            <a:r>
-              <a:rPr lang="de-DE" dirty="0"/>
-              <a:t>. A </a:t>
-            </a:r>
-            <a:r>
-              <a:rPr lang="de-DE" dirty="0" err="1"/>
-              <a:t>user</a:t>
-            </a:r>
-            <a:r>
-              <a:rPr lang="de-DE" dirty="0"/>
-              <a:t> </a:t>
-            </a:r>
-            <a:r>
-              <a:rPr lang="de-DE" dirty="0" err="1"/>
-              <a:t>can</a:t>
-            </a:r>
-            <a:r>
-              <a:rPr lang="de-DE" dirty="0"/>
-              <a:t> </a:t>
-            </a:r>
-            <a:r>
-              <a:rPr lang="de-DE" dirty="0" err="1"/>
-              <a:t>be</a:t>
-            </a:r>
-            <a:r>
-              <a:rPr lang="de-DE" dirty="0"/>
-              <a:t> </a:t>
-            </a:r>
-            <a:r>
-              <a:rPr lang="de-DE" dirty="0" err="1"/>
-              <a:t>access</a:t>
-            </a:r>
-            <a:r>
-              <a:rPr lang="de-DE" dirty="0"/>
-              <a:t> </a:t>
-            </a:r>
-            <a:r>
-              <a:rPr lang="de-DE" dirty="0" err="1"/>
-              <a:t>these</a:t>
-            </a:r>
-            <a:r>
-              <a:rPr lang="de-DE" dirty="0"/>
-              <a:t> </a:t>
-            </a:r>
-            <a:r>
-              <a:rPr lang="de-DE" dirty="0" err="1"/>
-              <a:t>schemas</a:t>
-            </a:r>
-            <a:r>
-              <a:rPr lang="de-DE" dirty="0"/>
-              <a:t> and </a:t>
-            </a:r>
-            <a:r>
-              <a:rPr lang="de-DE" dirty="0" err="1"/>
-              <a:t>their</a:t>
-            </a:r>
-            <a:r>
-              <a:rPr lang="de-DE" dirty="0"/>
-              <a:t> </a:t>
-            </a:r>
-            <a:r>
-              <a:rPr lang="de-DE" dirty="0" err="1"/>
-              <a:t>content</a:t>
-            </a:r>
-            <a:r>
-              <a:rPr lang="de-DE" dirty="0"/>
-              <a:t> </a:t>
-            </a:r>
-            <a:r>
-              <a:rPr lang="de-DE" dirty="0" err="1"/>
-              <a:t>if</a:t>
-            </a:r>
-            <a:r>
-              <a:rPr lang="de-DE" dirty="0"/>
-              <a:t> he </a:t>
-            </a:r>
-            <a:r>
-              <a:rPr lang="de-DE" dirty="0" err="1"/>
-              <a:t>has</a:t>
-            </a:r>
-            <a:r>
-              <a:rPr lang="de-DE" dirty="0"/>
-              <a:t> </a:t>
-            </a:r>
-            <a:r>
-              <a:rPr lang="de-DE" dirty="0" err="1"/>
-              <a:t>access</a:t>
-            </a:r>
-            <a:endParaRPr lang="de-DE" dirty="0"/>
+              <a:t>into</a:t>
+            </a:r>
+            <a:r>
+              <a:rPr lang="de-DE" dirty="0"/>
+              <a:t> a </a:t>
+            </a:r>
+            <a:r>
+              <a:rPr lang="de-DE" dirty="0" err="1"/>
+              <a:t>RESTfull</a:t>
+            </a:r>
+            <a:r>
+              <a:rPr lang="de-DE" dirty="0"/>
+              <a:t> API</a:t>
+            </a:r>
           </a:p>
         </p:txBody>
       </p:sp>
@@ -3488,7 +3806,7 @@
     </p:spTree>
     <p:extLst>
       <p:ext uri="{BB962C8B-B14F-4D97-AF65-F5344CB8AC3E}">
-        <p14:creationId xmlns:p14="http://schemas.microsoft.com/office/powerpoint/2010/main" val="2394990872"/>
+        <p14:creationId xmlns:p14="http://schemas.microsoft.com/office/powerpoint/2010/main" val="2663309437"/>
       </p:ext>
     </p:extLst>
   </p:cSld>
@@ -3732,7 +4050,7 @@
     </p:spTree>
     <p:extLst>
       <p:ext uri="{BB962C8B-B14F-4D97-AF65-F5344CB8AC3E}">
-        <p14:creationId xmlns:p14="http://schemas.microsoft.com/office/powerpoint/2010/main" val="3638475327"/>
+        <p14:creationId xmlns:p14="http://schemas.microsoft.com/office/powerpoint/2010/main" val="2394990872"/>
       </p:ext>
     </p:extLst>
   </p:cSld>
@@ -3787,55 +4105,80 @@
           <a:lstStyle/>
           <a:p>
             <a:r>
-              <a:rPr lang="de-DE" dirty="0" err="1"/>
-              <a:t>There</a:t>
-            </a:r>
-            <a:r>
-              <a:rPr lang="de-DE" dirty="0"/>
-              <a:t> </a:t>
-            </a:r>
-            <a:r>
-              <a:rPr lang="de-DE" dirty="0" err="1"/>
-              <a:t>are</a:t>
-            </a:r>
-            <a:r>
-              <a:rPr lang="de-DE" dirty="0"/>
-              <a:t> 3 </a:t>
-            </a:r>
-            <a:r>
-              <a:rPr lang="de-DE" dirty="0" err="1"/>
-              <a:t>Roles</a:t>
-            </a:r>
-            <a:r>
-              <a:rPr lang="de-DE" dirty="0"/>
-              <a:t> </a:t>
-            </a:r>
-            <a:r>
-              <a:rPr lang="de-DE" dirty="0" err="1"/>
-              <a:t>used</a:t>
-            </a:r>
-            <a:r>
-              <a:rPr lang="de-DE" dirty="0"/>
-              <a:t> </a:t>
-            </a:r>
-            <a:r>
-              <a:rPr lang="de-DE" dirty="0" err="1"/>
-              <a:t>by</a:t>
-            </a:r>
-            <a:r>
-              <a:rPr lang="de-DE" dirty="0"/>
-              <a:t> </a:t>
-            </a:r>
-            <a:r>
-              <a:rPr lang="de-DE" dirty="0" err="1"/>
-              <a:t>postgrest</a:t>
-            </a:r>
-            <a:br>
-              <a:rPr lang="de-DE" dirty="0"/>
-            </a:br>
-            <a:r>
-              <a:rPr lang="de-DE" dirty="0"/>
-              <a:t>Anonymous: A </a:t>
+              <a:rPr lang="de-DE" dirty="0"/>
+              <a:t>A </a:t>
+            </a:r>
+            <a:r>
+              <a:rPr lang="de-DE" dirty="0" err="1"/>
+              <a:t>database</a:t>
+            </a:r>
+            <a:r>
+              <a:rPr lang="de-DE" dirty="0"/>
+              <a:t> </a:t>
+            </a:r>
+            <a:r>
+              <a:rPr lang="de-DE" dirty="0" err="1"/>
+              <a:t>can</a:t>
+            </a:r>
+            <a:r>
+              <a:rPr lang="de-DE" dirty="0"/>
+              <a:t> </a:t>
+            </a:r>
+            <a:r>
+              <a:rPr lang="de-DE" dirty="0" err="1"/>
+              <a:t>contain</a:t>
+            </a:r>
+            <a:r>
+              <a:rPr lang="de-DE" dirty="0"/>
+              <a:t> </a:t>
+            </a:r>
+            <a:r>
+              <a:rPr lang="de-DE" dirty="0" err="1"/>
+              <a:t>one</a:t>
+            </a:r>
+            <a:r>
+              <a:rPr lang="de-DE" dirty="0"/>
+              <a:t> </a:t>
+            </a:r>
+            <a:r>
+              <a:rPr lang="de-DE" dirty="0" err="1"/>
+              <a:t>or</a:t>
+            </a:r>
+            <a:r>
+              <a:rPr lang="de-DE" dirty="0"/>
+              <a:t> multiple </a:t>
+            </a:r>
+            <a:r>
+              <a:rPr lang="de-DE" dirty="0" err="1"/>
+              <a:t>schemas</a:t>
+            </a:r>
+            <a:r>
+              <a:rPr lang="de-DE" dirty="0"/>
+              <a:t> </a:t>
+            </a:r>
+            <a:r>
+              <a:rPr lang="de-DE" dirty="0" err="1"/>
+              <a:t>which</a:t>
+            </a:r>
+            <a:r>
+              <a:rPr lang="de-DE" dirty="0"/>
+              <a:t> in turn </a:t>
+            </a:r>
+            <a:r>
+              <a:rPr lang="de-DE" dirty="0" err="1"/>
+              <a:t>can</a:t>
+            </a:r>
+            <a:r>
+              <a:rPr lang="de-DE" dirty="0"/>
+              <a:t> hold multiple </a:t>
+            </a:r>
+            <a:r>
+              <a:rPr lang="de-DE" dirty="0" err="1"/>
+              <a:t>tables</a:t>
+            </a:r>
+            <a:r>
+              <a:rPr lang="de-DE" dirty="0"/>
+              <a:t>. A </a:t>
             </a:r>
             <a:r>
               <a:rPr lang="de-DE" dirty="0" err="1"/>
@@ -3847,149 +4190,63 @@
             </a:r>
             <a:r>
               <a:rPr lang="de-DE" dirty="0" err="1"/>
-              <a:t>with</a:t>
-            </a:r>
-            <a:r>
-              <a:rPr lang="de-DE" dirty="0"/>
-              <a:t> </a:t>
-            </a:r>
-            <a:r>
-              <a:rPr lang="de-DE" dirty="0" err="1"/>
-              <a:t>no</a:t>
-            </a:r>
-            <a:r>
-              <a:rPr lang="de-DE" dirty="0"/>
-              <a:t> </a:t>
-            </a:r>
-            <a:r>
-              <a:rPr lang="de-DE" dirty="0" err="1"/>
-              <a:t>or</a:t>
-            </a:r>
-            <a:r>
-              <a:rPr lang="de-DE" dirty="0"/>
-              <a:t> invalid </a:t>
-            </a:r>
-            <a:r>
-              <a:rPr lang="de-DE" dirty="0" err="1"/>
-              <a:t>login</a:t>
-            </a:r>
-            <a:br>
-              <a:rPr lang="de-DE" dirty="0"/>
-            </a:br>
-            <a:r>
-              <a:rPr lang="de-DE" dirty="0"/>
-              <a:t>User: A </a:t>
-            </a:r>
-            <a:r>
-              <a:rPr lang="de-DE" dirty="0" err="1"/>
-              <a:t>user</a:t>
-            </a:r>
-            <a:r>
-              <a:rPr lang="de-DE" dirty="0"/>
-              <a:t> </a:t>
-            </a:r>
-            <a:r>
-              <a:rPr lang="de-DE" dirty="0" err="1"/>
-              <a:t>with</a:t>
-            </a:r>
-            <a:r>
-              <a:rPr lang="de-DE" dirty="0"/>
-              <a:t> a </a:t>
-            </a:r>
-            <a:r>
-              <a:rPr lang="de-DE" dirty="0" err="1"/>
-              <a:t>role</a:t>
-            </a:r>
-            <a:r>
-              <a:rPr lang="de-DE" dirty="0"/>
-              <a:t> </a:t>
-            </a:r>
-            <a:r>
-              <a:rPr lang="de-DE" dirty="0" err="1"/>
-              <a:t>configured</a:t>
-            </a:r>
-            <a:r>
-              <a:rPr lang="de-DE" dirty="0"/>
-              <a:t> in </a:t>
-            </a:r>
-            <a:r>
-              <a:rPr lang="de-DE" dirty="0" err="1"/>
-              <a:t>the</a:t>
-            </a:r>
-            <a:r>
-              <a:rPr lang="de-DE" dirty="0"/>
-              <a:t> DB and valid </a:t>
-            </a:r>
-            <a:r>
-              <a:rPr lang="de-DE" dirty="0" err="1"/>
-              <a:t>login</a:t>
-            </a:r>
-            <a:br>
-              <a:rPr lang="de-DE" dirty="0"/>
-            </a:br>
-            <a:r>
-              <a:rPr lang="de-DE" dirty="0"/>
-              <a:t>Authenticator: A </a:t>
-            </a:r>
-            <a:r>
-              <a:rPr lang="de-DE" dirty="0" err="1"/>
-              <a:t>role</a:t>
-            </a:r>
-            <a:r>
-              <a:rPr lang="de-DE" dirty="0"/>
-              <a:t> </a:t>
-            </a:r>
-            <a:r>
-              <a:rPr lang="de-DE" dirty="0" err="1"/>
-              <a:t>used</a:t>
-            </a:r>
-            <a:r>
-              <a:rPr lang="de-DE" dirty="0"/>
-              <a:t> </a:t>
-            </a:r>
-            <a:r>
-              <a:rPr lang="de-DE" dirty="0" err="1"/>
-              <a:t>by</a:t>
-            </a:r>
-            <a:r>
-              <a:rPr lang="de-DE" dirty="0"/>
-              <a:t> </a:t>
-            </a:r>
-            <a:r>
-              <a:rPr lang="de-DE" dirty="0" err="1"/>
-              <a:t>the</a:t>
-            </a:r>
-            <a:r>
-              <a:rPr lang="de-DE" dirty="0"/>
-              <a:t> </a:t>
-            </a:r>
-            <a:r>
-              <a:rPr lang="de-DE" dirty="0" err="1"/>
-              <a:t>server</a:t>
-            </a:r>
-            <a:r>
-              <a:rPr lang="de-DE" dirty="0"/>
-              <a:t> </a:t>
-            </a:r>
-            <a:r>
-              <a:rPr lang="de-DE" dirty="0" err="1"/>
-              <a:t>before</a:t>
-            </a:r>
-            <a:r>
-              <a:rPr lang="de-DE" dirty="0"/>
-              <a:t> </a:t>
-            </a:r>
-            <a:r>
-              <a:rPr lang="de-DE" dirty="0" err="1"/>
-              <a:t>authentication</a:t>
-            </a:r>
-            <a:r>
-              <a:rPr lang="de-DE" dirty="0"/>
-              <a:t>. </a:t>
-            </a:r>
-            <a:r>
-              <a:rPr lang="de-DE" dirty="0" err="1"/>
-              <a:t>Afterwards</a:t>
+              <a:t>can</a:t>
+            </a:r>
+            <a:r>
+              <a:rPr lang="de-DE" dirty="0"/>
+              <a:t> </a:t>
+            </a:r>
+            <a:r>
+              <a:rPr lang="de-DE" dirty="0" err="1"/>
+              <a:t>be</a:t>
+            </a:r>
+            <a:r>
+              <a:rPr lang="de-DE" dirty="0"/>
+              <a:t> </a:t>
+            </a:r>
+            <a:r>
+              <a:rPr lang="de-DE" dirty="0" err="1"/>
+              <a:t>access</a:t>
+            </a:r>
+            <a:r>
+              <a:rPr lang="de-DE" dirty="0"/>
+              <a:t> </a:t>
+            </a:r>
+            <a:r>
+              <a:rPr lang="de-DE" dirty="0" err="1"/>
+              <a:t>these</a:t>
+            </a:r>
+            <a:r>
+              <a:rPr lang="de-DE" dirty="0"/>
+              <a:t> </a:t>
+            </a:r>
+            <a:r>
+              <a:rPr lang="de-DE" dirty="0" err="1"/>
+              <a:t>schemas</a:t>
+            </a:r>
+            <a:r>
+              <a:rPr lang="de-DE" dirty="0"/>
+              <a:t> and </a:t>
+            </a:r>
+            <a:r>
+              <a:rPr lang="de-DE" dirty="0" err="1"/>
+              <a:t>their</a:t>
+            </a:r>
+            <a:r>
+              <a:rPr lang="de-DE" dirty="0"/>
+              <a:t> </a:t>
+            </a:r>
+            <a:r>
+              <a:rPr lang="de-DE" dirty="0" err="1"/>
+              <a:t>content</a:t>
+            </a:r>
+            <a:r>
+              <a:rPr lang="de-DE" dirty="0"/>
+              <a:t> </a:t>
+            </a:r>
+            <a:r>
+              <a:rPr lang="de-DE" dirty="0" err="1"/>
+              <a:t>if</a:t>
             </a:r>
             <a:r>
               <a:rPr lang="de-DE" dirty="0"/>
@@ -3997,39 +4254,15 @@
             </a:r>
             <a:r>
               <a:rPr lang="de-DE" dirty="0" err="1"/>
-              <a:t>becomes</a:t>
-            </a:r>
-            <a:r>
-              <a:rPr lang="de-DE" dirty="0"/>
-              <a:t> </a:t>
-            </a:r>
-            <a:r>
-              <a:rPr lang="de-DE" dirty="0" err="1"/>
-              <a:t>either</a:t>
-            </a:r>
-            <a:r>
-              <a:rPr lang="de-DE" dirty="0"/>
-              <a:t> a </a:t>
-            </a:r>
-            <a:r>
-              <a:rPr lang="de-DE" dirty="0" err="1"/>
-              <a:t>user</a:t>
-            </a:r>
-            <a:r>
-              <a:rPr lang="de-DE" dirty="0"/>
-              <a:t> </a:t>
-            </a:r>
-            <a:r>
-              <a:rPr lang="de-DE" dirty="0" err="1"/>
-              <a:t>or</a:t>
-            </a:r>
-            <a:r>
-              <a:rPr lang="de-DE" dirty="0"/>
-              <a:t> </a:t>
-            </a:r>
-            <a:r>
-              <a:rPr lang="de-DE" dirty="0" err="1"/>
-              <a:t>anonymous</a:t>
+              <a:t>has</a:t>
+            </a:r>
+            <a:r>
+              <a:rPr lang="de-DE" dirty="0"/>
+              <a:t> </a:t>
+            </a:r>
+            <a:r>
+              <a:rPr lang="de-DE" dirty="0" err="1"/>
+              <a:t>access</a:t>
             </a:r>
             <a:endParaRPr lang="de-DE" dirty="0"/>
           </a:p>
@@ -4061,7 +4294,7 @@
     </p:spTree>
     <p:extLst>
       <p:ext uri="{BB962C8B-B14F-4D97-AF65-F5344CB8AC3E}">
-        <p14:creationId xmlns:p14="http://schemas.microsoft.com/office/powerpoint/2010/main" val="819487705"/>
+        <p14:creationId xmlns:p14="http://schemas.microsoft.com/office/powerpoint/2010/main" val="3638475327"/>
       </p:ext>
     </p:extLst>
   </p:cSld>
@@ -4117,19 +4350,129 @@
           <a:p>
             <a:r>
               <a:rPr lang="de-DE" dirty="0" err="1"/>
-              <a:t>To</a:t>
-            </a:r>
-            <a:r>
-              <a:rPr lang="de-DE" dirty="0"/>
-              <a:t> </a:t>
-            </a:r>
-            <a:r>
-              <a:rPr lang="de-DE" dirty="0" err="1"/>
-              <a:t>allow</a:t>
-            </a:r>
-            <a:r>
-              <a:rPr lang="de-DE" dirty="0"/>
-              <a:t> </a:t>
+              <a:t>There</a:t>
+            </a:r>
+            <a:r>
+              <a:rPr lang="de-DE" dirty="0"/>
+              <a:t> </a:t>
+            </a:r>
+            <a:r>
+              <a:rPr lang="de-DE" dirty="0" err="1"/>
+              <a:t>are</a:t>
+            </a:r>
+            <a:r>
+              <a:rPr lang="de-DE" dirty="0"/>
+              <a:t> 3 </a:t>
+            </a:r>
+            <a:r>
+              <a:rPr lang="de-DE" dirty="0" err="1"/>
+              <a:t>Roles</a:t>
+            </a:r>
+            <a:r>
+              <a:rPr lang="de-DE" dirty="0"/>
+              <a:t> </a:t>
+            </a:r>
+            <a:r>
+              <a:rPr lang="de-DE" dirty="0" err="1"/>
+              <a:t>used</a:t>
+            </a:r>
+            <a:r>
+              <a:rPr lang="de-DE" dirty="0"/>
+              <a:t> </a:t>
+            </a:r>
+            <a:r>
+              <a:rPr lang="de-DE" dirty="0" err="1"/>
+              <a:t>by</a:t>
+            </a:r>
+            <a:r>
+              <a:rPr lang="de-DE" dirty="0"/>
+              <a:t> </a:t>
+            </a:r>
+            <a:r>
+              <a:rPr lang="de-DE" dirty="0" err="1"/>
+              <a:t>postgrest</a:t>
+            </a:r>
+            <a:br>
+              <a:rPr lang="de-DE" dirty="0"/>
+            </a:br>
+            <a:r>
+              <a:rPr lang="de-DE" dirty="0"/>
+              <a:t>Anonymous: A </a:t>
+            </a:r>
+            <a:r>
+              <a:rPr lang="de-DE" dirty="0" err="1"/>
+              <a:t>user</a:t>
+            </a:r>
+            <a:r>
+              <a:rPr lang="de-DE" dirty="0"/>
+              <a:t> </a:t>
+            </a:r>
+            <a:r>
+              <a:rPr lang="de-DE" dirty="0" err="1"/>
+              <a:t>with</a:t>
+            </a:r>
+            <a:r>
+              <a:rPr lang="de-DE" dirty="0"/>
+              <a:t> </a:t>
+            </a:r>
+            <a:r>
+              <a:rPr lang="de-DE" dirty="0" err="1"/>
+              <a:t>no</a:t>
+            </a:r>
+            <a:r>
+              <a:rPr lang="de-DE" dirty="0"/>
+              <a:t> </a:t>
+            </a:r>
+            <a:r>
+              <a:rPr lang="de-DE" dirty="0" err="1"/>
+              <a:t>or</a:t>
+            </a:r>
+            <a:r>
+              <a:rPr lang="de-DE" dirty="0"/>
+              <a:t> invalid </a:t>
+            </a:r>
+            <a:r>
+              <a:rPr lang="de-DE" dirty="0" err="1"/>
+              <a:t>login</a:t>
+            </a:r>
+            <a:br>
+              <a:rPr lang="de-DE" dirty="0"/>
+            </a:br>
+            <a:r>
+              <a:rPr lang="de-DE" dirty="0"/>
+              <a:t>User: A </a:t>
+            </a:r>
+            <a:r>
+              <a:rPr lang="de-DE" dirty="0" err="1"/>
+              <a:t>user</a:t>
+            </a:r>
+            <a:r>
+              <a:rPr lang="de-DE" dirty="0"/>
+              <a:t> </a:t>
+            </a:r>
+            <a:r>
+              <a:rPr lang="de-DE" dirty="0" err="1"/>
+              <a:t>with</a:t>
+            </a:r>
+            <a:r>
+              <a:rPr lang="de-DE" dirty="0"/>
+              <a:t> a </a:t>
+            </a:r>
+            <a:r>
+              <a:rPr lang="de-DE" dirty="0" err="1"/>
+              <a:t>role</a:t>
+            </a:r>
+            <a:r>
+              <a:rPr lang="de-DE" dirty="0"/>
+              <a:t> </a:t>
+            </a:r>
+            <a:r>
+              <a:rPr lang="de-DE" dirty="0" err="1"/>
+              <a:t>configured</a:t>
+            </a:r>
+            <a:r>
+              <a:rPr lang="de-DE" dirty="0"/>
+              <a:t> in </a:t>
             </a:r>
             <a:r>
               <a:rPr lang="de-DE" dirty="0" err="1"/>
@@ -4137,27 +4480,94 @@
             </a:r>
             <a:r>
               <a:rPr lang="de-DE" dirty="0"/>
-              <a:t> </a:t>
-            </a:r>
-            <a:r>
-              <a:rPr lang="de-DE" dirty="0" err="1"/>
-              <a:t>authenticator</a:t>
-            </a:r>
-            <a:r>
-              <a:rPr lang="de-DE" dirty="0"/>
-              <a:t> </a:t>
-            </a:r>
-            <a:r>
-              <a:rPr lang="de-DE" dirty="0" err="1"/>
-              <a:t>to</a:t>
-            </a:r>
-            <a:r>
-              <a:rPr lang="de-DE" dirty="0"/>
-              <a:t> switch </a:t>
-            </a:r>
-            <a:r>
-              <a:rPr lang="de-DE" dirty="0" err="1"/>
-              <a:t>to</a:t>
+              <a:t> DB and valid </a:t>
+            </a:r>
+            <a:r>
+              <a:rPr lang="de-DE" dirty="0" err="1"/>
+              <a:t>login</a:t>
+            </a:r>
+            <a:br>
+              <a:rPr lang="de-DE" dirty="0"/>
+            </a:br>
+            <a:r>
+              <a:rPr lang="de-DE" dirty="0"/>
+              <a:t>Authenticator: A </a:t>
+            </a:r>
+            <a:r>
+              <a:rPr lang="de-DE" dirty="0" err="1"/>
+              <a:t>role</a:t>
+            </a:r>
+            <a:r>
+              <a:rPr lang="de-DE" dirty="0"/>
+              <a:t> </a:t>
+            </a:r>
+            <a:r>
+              <a:rPr lang="de-DE" dirty="0" err="1"/>
+              <a:t>used</a:t>
+            </a:r>
+            <a:r>
+              <a:rPr lang="de-DE" dirty="0"/>
+              <a:t> </a:t>
+            </a:r>
+            <a:r>
+              <a:rPr lang="de-DE" dirty="0" err="1"/>
+              <a:t>by</a:t>
+            </a:r>
+            <a:r>
+              <a:rPr lang="de-DE" dirty="0"/>
+              <a:t> </a:t>
+            </a:r>
+            <a:r>
+              <a:rPr lang="de-DE" dirty="0" err="1"/>
+              <a:t>the</a:t>
+            </a:r>
+            <a:r>
+              <a:rPr lang="de-DE" dirty="0"/>
+              <a:t> </a:t>
+            </a:r>
+            <a:r>
+              <a:rPr lang="de-DE" dirty="0" err="1"/>
+              <a:t>server</a:t>
+            </a:r>
+            <a:r>
+              <a:rPr lang="de-DE" dirty="0"/>
+              <a:t> </a:t>
+            </a:r>
+            <a:r>
+              <a:rPr lang="de-DE" dirty="0" err="1"/>
+              <a:t>before</a:t>
+            </a:r>
+            <a:r>
+              <a:rPr lang="de-DE" dirty="0"/>
+              <a:t> </a:t>
+            </a:r>
+            <a:r>
+              <a:rPr lang="de-DE" dirty="0" err="1"/>
+              <a:t>authentication</a:t>
+            </a:r>
+            <a:r>
+              <a:rPr lang="de-DE" dirty="0"/>
+              <a:t>. </a:t>
+            </a:r>
+            <a:r>
+              <a:rPr lang="de-DE" dirty="0" err="1"/>
+              <a:t>Afterwards</a:t>
+            </a:r>
+            <a:r>
+              <a:rPr lang="de-DE" dirty="0"/>
+              <a:t> he </a:t>
+            </a:r>
+            <a:r>
+              <a:rPr lang="de-DE" dirty="0" err="1"/>
+              <a:t>becomes</a:t>
+            </a:r>
+            <a:r>
+              <a:rPr lang="de-DE" dirty="0"/>
+              <a:t> </a:t>
+            </a:r>
+            <a:r>
+              <a:rPr lang="de-DE" dirty="0" err="1"/>
+              <a:t>either</a:t>
             </a:r>
             <a:r>
               <a:rPr lang="de-DE" dirty="0"/>
@@ -4165,79 +4575,23 @@
             </a:r>
             <a:r>
               <a:rPr lang="de-DE" dirty="0" err="1"/>
-              <a:t>role</a:t>
-            </a:r>
-            <a:r>
-              <a:rPr lang="de-DE" dirty="0"/>
-              <a:t> </a:t>
-            </a:r>
-            <a:r>
-              <a:rPr lang="de-DE" dirty="0" err="1"/>
-              <a:t>it</a:t>
-            </a:r>
-            <a:r>
-              <a:rPr lang="de-DE" dirty="0"/>
-              <a:t> </a:t>
-            </a:r>
-            <a:r>
-              <a:rPr lang="de-DE" dirty="0" err="1"/>
-              <a:t>needs</a:t>
-            </a:r>
-            <a:r>
-              <a:rPr lang="de-DE" dirty="0"/>
-              <a:t> </a:t>
-            </a:r>
-            <a:r>
-              <a:rPr lang="de-DE" dirty="0" err="1"/>
-              <a:t>to</a:t>
-            </a:r>
-            <a:r>
-              <a:rPr lang="de-DE" dirty="0"/>
-              <a:t> </a:t>
-            </a:r>
-            <a:r>
-              <a:rPr lang="de-DE" dirty="0" err="1"/>
-              <a:t>be</a:t>
-            </a:r>
-            <a:r>
-              <a:rPr lang="de-DE" dirty="0"/>
-              <a:t> </a:t>
-            </a:r>
-            <a:r>
-              <a:rPr lang="de-DE" dirty="0" err="1"/>
-              <a:t>configured</a:t>
-            </a:r>
-            <a:r>
-              <a:rPr lang="de-DE" dirty="0"/>
-              <a:t> </a:t>
-            </a:r>
-            <a:r>
-              <a:rPr lang="de-DE" dirty="0" err="1"/>
-              <a:t>by</a:t>
-            </a:r>
-            <a:r>
-              <a:rPr lang="de-DE" dirty="0"/>
-              <a:t> </a:t>
-            </a:r>
-            <a:r>
-              <a:rPr lang="de-DE" dirty="0" err="1"/>
-              <a:t>the</a:t>
-            </a:r>
-            <a:r>
-              <a:rPr lang="de-DE" dirty="0"/>
-              <a:t> </a:t>
-            </a:r>
-            <a:r>
-              <a:rPr lang="de-DE" dirty="0" err="1"/>
-              <a:t>datbase</a:t>
-            </a:r>
-            <a:r>
-              <a:rPr lang="de-DE" dirty="0"/>
-              <a:t> </a:t>
-            </a:r>
-            <a:r>
-              <a:rPr lang="de-DE" dirty="0" err="1"/>
-              <a:t>administrator</a:t>
+              <a:t>user</a:t>
+            </a:r>
+            <a:r>
+              <a:rPr lang="de-DE" dirty="0"/>
+              <a:t> </a:t>
+            </a:r>
+            <a:r>
+              <a:rPr lang="de-DE" dirty="0" err="1"/>
+              <a:t>or</a:t>
+            </a:r>
+            <a:r>
+              <a:rPr lang="de-DE" dirty="0"/>
+              <a:t> </a:t>
+            </a:r>
+            <a:r>
+              <a:rPr lang="de-DE" dirty="0" err="1"/>
+              <a:t>anonymous</a:t>
             </a:r>
             <a:endParaRPr lang="de-DE" dirty="0"/>
           </a:p>
@@ -4269,7 +4623,7 @@
     </p:spTree>
     <p:extLst>
       <p:ext uri="{BB962C8B-B14F-4D97-AF65-F5344CB8AC3E}">
-        <p14:creationId xmlns:p14="http://schemas.microsoft.com/office/powerpoint/2010/main" val="1522675696"/>
+        <p14:creationId xmlns:p14="http://schemas.microsoft.com/office/powerpoint/2010/main" val="819487705"/>
       </p:ext>
     </p:extLst>
   </p:cSld>
@@ -4505,7 +4859,7 @@
           <a:p>
             <a:fld id="{396F54F1-1DFF-4DB1-A531-83C57C7681CC}" type="datetime1">
               <a:rPr lang="de-DE" smtClean="0"/>
-              <a:t>17.12.2019</a:t>
+              <a:t>18.12.2019</a:t>
             </a:fld>
             <a:endParaRPr lang="de-DE"/>
           </a:p>
@@ -4713,7 +5067,7 @@
           <a:p>
             <a:fld id="{059F51C3-70DF-468B-957B-78A44C221DCB}" type="datetime1">
               <a:rPr lang="de-DE" smtClean="0"/>
-              <a:t>17.12.2019</a:t>
+              <a:t>18.12.2019</a:t>
             </a:fld>
             <a:endParaRPr lang="de-DE"/>
           </a:p>
@@ -4969,7 +5323,7 @@
           <a:p>
             <a:fld id="{FEA9067C-24FE-4D51-92EC-73678E3B4EE1}" type="datetime1">
               <a:rPr lang="de-DE" smtClean="0"/>
-              <a:t>17.12.2019</a:t>
+              <a:t>18.12.2019</a:t>
             </a:fld>
             <a:endParaRPr lang="de-DE"/>
           </a:p>
@@ -5143,7 +5497,7 @@
           <a:p>
             <a:fld id="{0332A140-1982-42EA-8402-20F66703A04A}" type="datetime1">
               <a:rPr lang="de-DE" smtClean="0"/>
-              <a:t>17.12.2019</a:t>
+              <a:t>18.12.2019</a:t>
             </a:fld>
             <a:endParaRPr lang="de-DE"/>
           </a:p>
@@ -5486,7 +5840,7 @@
           <a:p>
             <a:fld id="{9B147060-AA57-48A3-8853-EB6B850D9EC0}" type="datetime1">
               <a:rPr lang="de-DE" smtClean="0"/>
-              <a:t>17.12.2019</a:t>
+              <a:t>18.12.2019</a:t>
             </a:fld>
             <a:endParaRPr lang="de-DE"/>
           </a:p>
@@ -5761,7 +6115,7 @@
           <a:p>
             <a:fld id="{84E382B0-A7F4-41E3-9A60-78BD73912E0E}" type="datetime1">
               <a:rPr lang="de-DE" smtClean="0"/>
-              <a:t>17.12.2019</a:t>
+              <a:t>18.12.2019</a:t>
             </a:fld>
             <a:endParaRPr lang="de-DE"/>
           </a:p>
@@ -6140,7 +6494,7 @@
           <a:p>
             <a:fld id="{AB91CC30-A911-4529-BE1E-F3D367C0C4A0}" type="datetime1">
               <a:rPr lang="de-DE" smtClean="0"/>
-              <a:t>17.12.2019</a:t>
+              <a:t>18.12.2019</a:t>
             </a:fld>
             <a:endParaRPr lang="de-DE"/>
           </a:p>
@@ -6258,7 +6612,7 @@
           <a:p>
             <a:fld id="{B2C79B8F-838C-4739-B333-4EA7EE2E1089}" type="datetime1">
               <a:rPr lang="de-DE" smtClean="0"/>
-              <a:t>17.12.2019</a:t>
+              <a:t>18.12.2019</a:t>
             </a:fld>
             <a:endParaRPr lang="de-DE"/>
           </a:p>
@@ -6429,7 +6783,7 @@
           <a:p>
             <a:fld id="{245598D2-316D-47DB-8922-D0ECF178A25E}" type="datetime1">
               <a:rPr lang="de-DE" smtClean="0"/>
-              <a:t>17.12.2019</a:t>
+              <a:t>18.12.2019</a:t>
             </a:fld>
             <a:endParaRPr lang="de-DE"/>
           </a:p>
@@ -6783,7 +7137,7 @@
           <a:p>
             <a:fld id="{177150D3-12E3-4BD4-B523-066A6A1BC811}" type="datetime1">
               <a:rPr lang="de-DE" smtClean="0"/>
-              <a:t>17.12.2019</a:t>
+              <a:t>18.12.2019</a:t>
             </a:fld>
             <a:endParaRPr lang="de-DE"/>
           </a:p>
@@ -7165,7 +7519,7 @@
           <a:p>
             <a:fld id="{D771AAB5-031E-4396-973F-84803E054E65}" type="datetime1">
               <a:rPr lang="de-DE" smtClean="0"/>
-              <a:t>17.12.2019</a:t>
+              <a:t>18.12.2019</a:t>
             </a:fld>
             <a:endParaRPr lang="de-DE"/>
           </a:p>
@@ -7452,7 +7806,7 @@
           <a:p>
             <a:fld id="{4CDA7A3A-E591-48BF-BA30-CD5FEABD267A}" type="datetime1">
               <a:rPr lang="de-DE" smtClean="0"/>
-              <a:t>17.12.2019</a:t>
+              <a:t>18.12.2019</a:t>
             </a:fld>
             <a:endParaRPr lang="de-DE"/>
           </a:p>
@@ -8125,6 +8479,41 @@
           </a:p>
         </p:txBody>
       </p:sp>
+      <p:pic>
+        <p:nvPicPr>
+          <p:cNvPr id="6" name="Inhaltsplatzhalter 5" descr="Ein Bild, das Licht enthält.&#10;&#10;Automatisch generierte Beschreibung">
+            <a:extLst>
+              <a:ext uri="{FF2B5EF4-FFF2-40B4-BE49-F238E27FC236}">
+                <a16:creationId xmlns:a16="http://schemas.microsoft.com/office/drawing/2014/main" id="{8F3FE626-347C-4297-AC93-EA8A0BC5026C}"/>
+              </a:ext>
+            </a:extLst>
+          </p:cNvPr>
+          <p:cNvPicPr>
+            <a:picLocks noGrp="1" noChangeAspect="1"/>
+          </p:cNvPicPr>
+          <p:nvPr>
+            <p:ph idx="1"/>
+          </p:nvPr>
+        </p:nvPicPr>
+        <p:blipFill>
+          <a:blip r:embed="rId3">
+            <a:extLst>
+              <a:ext uri="{28A0092B-C50C-407E-A947-70E740481C1C}">
+                <a14:useLocalDpi xmlns:a14="http://schemas.microsoft.com/office/drawing/2010/main" val="0"/>
+              </a:ext>
+            </a:extLst>
+          </a:blip>
+          <a:stretch>
+            <a:fillRect/>
+          </a:stretch>
+        </p:blipFill>
+        <p:spPr>
+          <a:xfrm>
+            <a:off x="2475865" y="1974149"/>
+            <a:ext cx="7240270" cy="4098266"/>
+          </a:xfrm>
+        </p:spPr>
+      </p:pic>
       <p:sp>
         <p:nvSpPr>
           <p:cNvPr id="4" name="Foliennummernplatzhalter 3">
@@ -8141,6 +8530,93 @@
             <p:ph type="sldNum" sz="quarter" idx="12"/>
           </p:nvPr>
         </p:nvSpPr>
+        <p:spPr/>
+        <p:txBody>
+          <a:bodyPr/>
+          <a:lstStyle/>
+          <a:p>
+            <a:fld id="{D8C4CF5F-7A5F-4ACB-87CC-3EAB525DB293}" type="slidenum">
+              <a:rPr lang="de-DE" sz="2800" smtClean="0"/>
+              <a:t>10</a:t>
+            </a:fld>
+            <a:endParaRPr lang="de-DE" sz="2800" dirty="0"/>
+          </a:p>
+        </p:txBody>
+      </p:sp>
+    </p:spTree>
+    <p:extLst>
+      <p:ext uri="{BB962C8B-B14F-4D97-AF65-F5344CB8AC3E}">
+        <p14:creationId xmlns:p14="http://schemas.microsoft.com/office/powerpoint/2010/main" val="576598792"/>
+      </p:ext>
+    </p:extLst>
+  </p:cSld>
+  <p:clrMapOvr>
+    <a:masterClrMapping/>
+  </p:clrMapOvr>
+</p:sld>
+</file>
+
+<file path=ppt/slides/slide11.xml><?xml version="1.0" encoding="utf-8"?>
+<p:sld xmlns:a="http://schemas.openxmlformats.org/drawingml/2006/main" xmlns:r="http://schemas.openxmlformats.org/officeDocument/2006/relationships" xmlns:p="http://schemas.openxmlformats.org/presentationml/2006/main">
+  <p:cSld>
+    <p:spTree>
+      <p:nvGrpSpPr>
+        <p:cNvPr id="1" name=""/>
+        <p:cNvGrpSpPr/>
+        <p:nvPr/>
+      </p:nvGrpSpPr>
+      <p:grpSpPr>
+        <a:xfrm>
+          <a:off x="0" y="0"/>
+          <a:ext cx="0" cy="0"/>
+          <a:chOff x="0" y="0"/>
+          <a:chExt cx="0" cy="0"/>
+        </a:xfrm>
+      </p:grpSpPr>
+      <p:sp>
+        <p:nvSpPr>
+          <p:cNvPr id="2" name="Titel 1">
+            <a:extLst>
+              <a:ext uri="{FF2B5EF4-FFF2-40B4-BE49-F238E27FC236}">
+                <a16:creationId xmlns:a16="http://schemas.microsoft.com/office/drawing/2014/main" id="{7290E42A-69C7-4A22-8F14-E6BE7ADEE31D}"/>
+              </a:ext>
+            </a:extLst>
+          </p:cNvPr>
+          <p:cNvSpPr>
+            <a:spLocks noGrp="1"/>
+          </p:cNvSpPr>
+          <p:nvPr>
+            <p:ph type="title"/>
+          </p:nvPr>
+        </p:nvSpPr>
+        <p:spPr/>
+        <p:txBody>
+          <a:bodyPr/>
+          <a:lstStyle/>
+          <a:p>
+            <a:r>
+              <a:rPr lang="de-DE" dirty="0"/>
+              <a:t>Authentication</a:t>
+            </a:r>
+          </a:p>
+        </p:txBody>
+      </p:sp>
+      <p:sp>
+        <p:nvSpPr>
+          <p:cNvPr id="4" name="Foliennummernplatzhalter 3">
+            <a:extLst>
+              <a:ext uri="{FF2B5EF4-FFF2-40B4-BE49-F238E27FC236}">
+                <a16:creationId xmlns:a16="http://schemas.microsoft.com/office/drawing/2014/main" id="{59DAD071-9C07-4592-91EB-7BE35ACEF0E5}"/>
+              </a:ext>
+            </a:extLst>
+          </p:cNvPr>
+          <p:cNvSpPr>
+            <a:spLocks noGrp="1"/>
+          </p:cNvSpPr>
+          <p:nvPr>
+            <p:ph type="sldNum" sz="quarter" idx="12"/>
+          </p:nvPr>
+        </p:nvSpPr>
         <p:spPr>
           <a:xfrm>
             <a:off x="9900459" y="6459785"/>
@@ -8153,7 +8629,7 @@
           <a:p>
             <a:fld id="{D8C4CF5F-7A5F-4ACB-87CC-3EAB525DB293}" type="slidenum">
               <a:rPr lang="de-DE" sz="2800" smtClean="0"/>
-              <a:t>10</a:t>
+              <a:t>11</a:t>
             </a:fld>
             <a:endParaRPr lang="de-DE" sz="2800" dirty="0"/>
           </a:p>
@@ -8207,7 +8683,7 @@
 </p:sld>
 </file>
 
-<file path=ppt/slides/slide11.xml><?xml version="1.0" encoding="utf-8"?>
+<file path=ppt/slides/slide12.xml><?xml version="1.0" encoding="utf-8"?>
 <p:sld xmlns:a="http://schemas.openxmlformats.org/drawingml/2006/main" xmlns:r="http://schemas.openxmlformats.org/officeDocument/2006/relationships" xmlns:p="http://schemas.openxmlformats.org/presentationml/2006/main">
   <p:cSld>
     <p:spTree>
@@ -8280,7 +8756,7 @@
           <a:p>
             <a:fld id="{D8C4CF5F-7A5F-4ACB-87CC-3EAB525DB293}" type="slidenum">
               <a:rPr lang="de-DE" sz="2800" smtClean="0"/>
-              <a:t>11</a:t>
+              <a:t>12</a:t>
             </a:fld>
             <a:endParaRPr lang="de-DE" sz="2800" dirty="0"/>
           </a:p>
@@ -8681,7 +9157,7 @@
 </p:sld>
 </file>
 
-<file path=ppt/slides/slide12.xml><?xml version="1.0" encoding="utf-8"?>
+<file path=ppt/slides/slide13.xml><?xml version="1.0" encoding="utf-8"?>
 <p:sld xmlns:a="http://schemas.openxmlformats.org/drawingml/2006/main" xmlns:r="http://schemas.openxmlformats.org/officeDocument/2006/relationships" xmlns:p="http://schemas.openxmlformats.org/presentationml/2006/main">
   <p:cSld>
     <p:spTree>
@@ -8759,7 +9235,7 @@
           <a:p>
             <a:fld id="{D8C4CF5F-7A5F-4ACB-87CC-3EAB525DB293}" type="slidenum">
               <a:rPr lang="de-DE" sz="2800" smtClean="0"/>
-              <a:t>12</a:t>
+              <a:t>13</a:t>
             </a:fld>
             <a:endParaRPr lang="de-DE" sz="2800" dirty="0"/>
           </a:p>
@@ -9252,7 +9728,7 @@
 </p:sld>
 </file>
 
-<file path=ppt/slides/slide13.xml><?xml version="1.0" encoding="utf-8"?>
+<file path=ppt/slides/slide14.xml><?xml version="1.0" encoding="utf-8"?>
 <p:sld xmlns:a="http://schemas.openxmlformats.org/drawingml/2006/main" xmlns:r="http://schemas.openxmlformats.org/officeDocument/2006/relationships" xmlns:p="http://schemas.openxmlformats.org/presentationml/2006/main">
   <p:cSld>
     <p:spTree>
@@ -9342,7 +9818,7 @@
           <a:p>
             <a:fld id="{D8C4CF5F-7A5F-4ACB-87CC-3EAB525DB293}" type="slidenum">
               <a:rPr lang="de-DE" sz="2800" smtClean="0"/>
-              <a:t>13</a:t>
+              <a:t>14</a:t>
             </a:fld>
             <a:endParaRPr lang="de-DE" sz="2800" dirty="0"/>
           </a:p>
@@ -9391,7 +9867,7 @@
 </p:sld>
 </file>
 
-<file path=ppt/slides/slide14.xml><?xml version="1.0" encoding="utf-8"?>
+<file path=ppt/slides/slide15.xml><?xml version="1.0" encoding="utf-8"?>
 <p:sld xmlns:a="http://schemas.openxmlformats.org/drawingml/2006/main" xmlns:r="http://schemas.openxmlformats.org/officeDocument/2006/relationships" xmlns:p="http://schemas.openxmlformats.org/presentationml/2006/main">
   <p:cSld>
     <p:spTree>
@@ -9489,7 +9965,7 @@
           <a:p>
             <a:fld id="{D8C4CF5F-7A5F-4ACB-87CC-3EAB525DB293}" type="slidenum">
               <a:rPr lang="de-DE" sz="2800" smtClean="0"/>
-              <a:t>14</a:t>
+              <a:t>15</a:t>
             </a:fld>
             <a:endParaRPr lang="de-DE" sz="2800" dirty="0"/>
           </a:p>
@@ -9743,7 +10219,7 @@
 </p:sld>
 </file>
 
-<file path=ppt/slides/slide15.xml><?xml version="1.0" encoding="utf-8"?>
+<file path=ppt/slides/slide16.xml><?xml version="1.0" encoding="utf-8"?>
 <p:sld xmlns:a="http://schemas.openxmlformats.org/drawingml/2006/main" xmlns:r="http://schemas.openxmlformats.org/officeDocument/2006/relationships" xmlns:p="http://schemas.openxmlformats.org/presentationml/2006/main">
   <p:cSld>
     <p:spTree>
@@ -9821,7 +10297,7 @@
           <a:p>
             <a:fld id="{D8C4CF5F-7A5F-4ACB-87CC-3EAB525DB293}" type="slidenum">
               <a:rPr lang="de-DE" sz="2800" smtClean="0"/>
-              <a:t>15</a:t>
+              <a:t>16</a:t>
             </a:fld>
             <a:endParaRPr lang="de-DE" sz="2800" dirty="0"/>
           </a:p>
@@ -9875,7 +10351,7 @@
 </p:sld>
 </file>
 
-<file path=ppt/slides/slide16.xml><?xml version="1.0" encoding="utf-8"?>
+<file path=ppt/slides/slide17.xml><?xml version="1.0" encoding="utf-8"?>
 <p:sld xmlns:a="http://schemas.openxmlformats.org/drawingml/2006/main" xmlns:r="http://schemas.openxmlformats.org/officeDocument/2006/relationships" xmlns:p="http://schemas.openxmlformats.org/presentationml/2006/main">
   <p:cSld>
     <p:spTree>
@@ -9973,7 +10449,7 @@
           <a:p>
             <a:fld id="{D8C4CF5F-7A5F-4ACB-87CC-3EAB525DB293}" type="slidenum">
               <a:rPr lang="de-DE" sz="2800" smtClean="0"/>
-              <a:t>16</a:t>
+              <a:t>17</a:t>
             </a:fld>
             <a:endParaRPr lang="de-DE" sz="2800" dirty="0"/>
           </a:p>
@@ -10067,7 +10543,7 @@
 </p:sld>
 </file>
 
-<file path=ppt/slides/slide17.xml><?xml version="1.0" encoding="utf-8"?>
+<file path=ppt/slides/slide18.xml><?xml version="1.0" encoding="utf-8"?>
 <p:sld xmlns:a="http://schemas.openxmlformats.org/drawingml/2006/main" xmlns:r="http://schemas.openxmlformats.org/officeDocument/2006/relationships" xmlns:p="http://schemas.openxmlformats.org/presentationml/2006/main">
   <p:cSld>
     <p:spTree>
@@ -10165,7 +10641,7 @@
           <a:p>
             <a:fld id="{D8C4CF5F-7A5F-4ACB-87CC-3EAB525DB293}" type="slidenum">
               <a:rPr lang="de-DE" sz="2800" smtClean="0"/>
-              <a:t>17</a:t>
+              <a:t>18</a:t>
             </a:fld>
             <a:endParaRPr lang="de-DE" sz="2800" dirty="0"/>
           </a:p>
@@ -10375,7 +10851,7 @@
 </p:sld>
 </file>
 
-<file path=ppt/slides/slide18.xml><?xml version="1.0" encoding="utf-8"?>
+<file path=ppt/slides/slide19.xml><?xml version="1.0" encoding="utf-8"?>
 <p:sld xmlns:a="http://schemas.openxmlformats.org/drawingml/2006/main" xmlns:r="http://schemas.openxmlformats.org/officeDocument/2006/relationships" xmlns:p="http://schemas.openxmlformats.org/presentationml/2006/main">
   <p:cSld>
     <p:spTree>
@@ -10453,7 +10929,7 @@
           <a:p>
             <a:fld id="{D8C4CF5F-7A5F-4ACB-87CC-3EAB525DB293}" type="slidenum">
               <a:rPr lang="de-DE" sz="2800" smtClean="0"/>
-              <a:t>18</a:t>
+              <a:t>19</a:t>
             </a:fld>
             <a:endParaRPr lang="de-DE" sz="2800" dirty="0"/>
           </a:p>
@@ -10661,7 +11137,7 @@
 </p:sld>
 </file>
 
-<file path=ppt/slides/slide19.xml><?xml version="1.0" encoding="utf-8"?>
+<file path=ppt/slides/slide2.xml><?xml version="1.0" encoding="utf-8"?>
 <p:sld xmlns:a="http://schemas.openxmlformats.org/drawingml/2006/main" xmlns:r="http://schemas.openxmlformats.org/officeDocument/2006/relationships" xmlns:p="http://schemas.openxmlformats.org/presentationml/2006/main">
   <p:cSld>
     <p:spTree>
@@ -10683,6 +11159,143 @@
           <p:cNvPr id="2" name="Titel 1">
             <a:extLst>
               <a:ext uri="{FF2B5EF4-FFF2-40B4-BE49-F238E27FC236}">
+                <a16:creationId xmlns:a16="http://schemas.microsoft.com/office/drawing/2014/main" id="{9F0A8275-5587-4187-AB79-939DBF645726}"/>
+              </a:ext>
+            </a:extLst>
+          </p:cNvPr>
+          <p:cNvSpPr>
+            <a:spLocks noGrp="1"/>
+          </p:cNvSpPr>
+          <p:nvPr>
+            <p:ph type="title"/>
+          </p:nvPr>
+        </p:nvSpPr>
+        <p:spPr/>
+        <p:txBody>
+          <a:bodyPr/>
+          <a:lstStyle/>
+          <a:p>
+            <a:r>
+              <a:rPr lang="de-DE" dirty="0" err="1"/>
+              <a:t>Before</a:t>
+            </a:r>
+            <a:r>
+              <a:rPr lang="de-DE" dirty="0"/>
+              <a:t> </a:t>
+            </a:r>
+            <a:r>
+              <a:rPr lang="de-DE" dirty="0" err="1"/>
+              <a:t>we</a:t>
+            </a:r>
+            <a:r>
+              <a:rPr lang="de-DE" dirty="0"/>
+              <a:t> Start</a:t>
+            </a:r>
+          </a:p>
+        </p:txBody>
+      </p:sp>
+      <p:sp>
+        <p:nvSpPr>
+          <p:cNvPr id="4" name="Inhaltsplatzhalter 3">
+            <a:extLst>
+              <a:ext uri="{FF2B5EF4-FFF2-40B4-BE49-F238E27FC236}">
+                <a16:creationId xmlns:a16="http://schemas.microsoft.com/office/drawing/2014/main" id="{70804366-1281-4181-972E-4E0D2095B867}"/>
+              </a:ext>
+            </a:extLst>
+          </p:cNvPr>
+          <p:cNvSpPr>
+            <a:spLocks noGrp="1"/>
+          </p:cNvSpPr>
+          <p:nvPr>
+            <p:ph idx="1"/>
+          </p:nvPr>
+        </p:nvSpPr>
+        <p:spPr>
+          <a:xfrm>
+            <a:off x="497651" y="2267762"/>
+            <a:ext cx="10658029" cy="4023360"/>
+          </a:xfrm>
+        </p:spPr>
+        <p:txBody>
+          <a:bodyPr>
+            <a:normAutofit/>
+          </a:bodyPr>
+          <a:lstStyle/>
+          <a:p>
+            <a:pPr marL="749808" lvl="4" indent="0">
+              <a:buNone/>
+            </a:pPr>
+            <a:r>
+              <a:rPr lang="de-DE" sz="7200" dirty="0"/>
+              <a:t>Download </a:t>
+            </a:r>
+            <a:r>
+              <a:rPr lang="de-DE" sz="7200" dirty="0" err="1"/>
+              <a:t>the</a:t>
+            </a:r>
+            <a:r>
+              <a:rPr lang="de-DE" sz="7200" dirty="0"/>
+              <a:t> Repository:</a:t>
+            </a:r>
+          </a:p>
+          <a:p>
+            <a:pPr marL="749808" lvl="4" indent="0">
+              <a:buNone/>
+            </a:pPr>
+            <a:endParaRPr lang="de-DE" sz="7200" dirty="0"/>
+          </a:p>
+          <a:p>
+            <a:pPr marL="749808" lvl="4" indent="0">
+              <a:buNone/>
+            </a:pPr>
+            <a:r>
+              <a:rPr lang="de-DE" sz="4000" b="1" dirty="0">
+                <a:solidFill>
+                  <a:schemeClr val="bg2">
+                    <a:lumMod val="50000"/>
+                  </a:schemeClr>
+                </a:solidFill>
+              </a:rPr>
+              <a:t>https://github.com/sebivenlo/PostgREST2019</a:t>
+            </a:r>
+          </a:p>
+        </p:txBody>
+      </p:sp>
+    </p:spTree>
+    <p:extLst>
+      <p:ext uri="{BB962C8B-B14F-4D97-AF65-F5344CB8AC3E}">
+        <p14:creationId xmlns:p14="http://schemas.microsoft.com/office/powerpoint/2010/main" val="3509973279"/>
+      </p:ext>
+    </p:extLst>
+  </p:cSld>
+  <p:clrMapOvr>
+    <a:masterClrMapping/>
+  </p:clrMapOvr>
+</p:sld>
+</file>
+
+<file path=ppt/slides/slide20.xml><?xml version="1.0" encoding="utf-8"?>
+<p:sld xmlns:a="http://schemas.openxmlformats.org/drawingml/2006/main" xmlns:r="http://schemas.openxmlformats.org/officeDocument/2006/relationships" xmlns:p="http://schemas.openxmlformats.org/presentationml/2006/main">
+  <p:cSld>
+    <p:spTree>
+      <p:nvGrpSpPr>
+        <p:cNvPr id="1" name=""/>
+        <p:cNvGrpSpPr/>
+        <p:nvPr/>
+      </p:nvGrpSpPr>
+      <p:grpSpPr>
+        <a:xfrm>
+          <a:off x="0" y="0"/>
+          <a:ext cx="0" cy="0"/>
+          <a:chOff x="0" y="0"/>
+          <a:chExt cx="0" cy="0"/>
+        </a:xfrm>
+      </p:grpSpPr>
+      <p:sp>
+        <p:nvSpPr>
+          <p:cNvPr id="2" name="Titel 1">
+            <a:extLst>
+              <a:ext uri="{FF2B5EF4-FFF2-40B4-BE49-F238E27FC236}">
                 <a16:creationId xmlns:a16="http://schemas.microsoft.com/office/drawing/2014/main" id="{7290E42A-69C7-4A22-8F14-E6BE7ADEE31D}"/>
               </a:ext>
             </a:extLst>
@@ -10759,7 +11372,7 @@
           <a:p>
             <a:fld id="{D8C4CF5F-7A5F-4ACB-87CC-3EAB525DB293}" type="slidenum">
               <a:rPr lang="de-DE" sz="2800" smtClean="0"/>
-              <a:t>19</a:t>
+              <a:t>20</a:t>
             </a:fld>
             <a:endParaRPr lang="de-DE" sz="2800" dirty="0"/>
           </a:p>
@@ -10989,466 +11602,6 @@
 </p:sld>
 </file>
 
-<file path=ppt/slides/slide2.xml><?xml version="1.0" encoding="utf-8"?>
-<p:sld xmlns:a="http://schemas.openxmlformats.org/drawingml/2006/main" xmlns:r="http://schemas.openxmlformats.org/officeDocument/2006/relationships" xmlns:p="http://schemas.openxmlformats.org/presentationml/2006/main">
-  <p:cSld>
-    <p:spTree>
-      <p:nvGrpSpPr>
-        <p:cNvPr id="1" name=""/>
-        <p:cNvGrpSpPr/>
-        <p:nvPr/>
-      </p:nvGrpSpPr>
-      <p:grpSpPr>
-        <a:xfrm>
-          <a:off x="0" y="0"/>
-          <a:ext cx="0" cy="0"/>
-          <a:chOff x="0" y="0"/>
-          <a:chExt cx="0" cy="0"/>
-        </a:xfrm>
-      </p:grpSpPr>
-      <p:sp>
-        <p:nvSpPr>
-          <p:cNvPr id="2" name="Titel 1">
-            <a:extLst>
-              <a:ext uri="{FF2B5EF4-FFF2-40B4-BE49-F238E27FC236}">
-                <a16:creationId xmlns:a16="http://schemas.microsoft.com/office/drawing/2014/main" id="{9F0A8275-5587-4187-AB79-939DBF645726}"/>
-              </a:ext>
-            </a:extLst>
-          </p:cNvPr>
-          <p:cNvSpPr>
-            <a:spLocks noGrp="1"/>
-          </p:cNvSpPr>
-          <p:nvPr>
-            <p:ph type="title"/>
-          </p:nvPr>
-        </p:nvSpPr>
-        <p:spPr/>
-        <p:txBody>
-          <a:bodyPr/>
-          <a:lstStyle/>
-          <a:p>
-            <a:r>
-              <a:rPr lang="de-DE" dirty="0" err="1"/>
-              <a:t>Before</a:t>
-            </a:r>
-            <a:r>
-              <a:rPr lang="de-DE" dirty="0"/>
-              <a:t> </a:t>
-            </a:r>
-            <a:r>
-              <a:rPr lang="de-DE" dirty="0" err="1"/>
-              <a:t>we</a:t>
-            </a:r>
-            <a:r>
-              <a:rPr lang="de-DE" dirty="0"/>
-              <a:t> Start</a:t>
-            </a:r>
-          </a:p>
-        </p:txBody>
-      </p:sp>
-      <p:sp>
-        <p:nvSpPr>
-          <p:cNvPr id="4" name="Inhaltsplatzhalter 3">
-            <a:extLst>
-              <a:ext uri="{FF2B5EF4-FFF2-40B4-BE49-F238E27FC236}">
-                <a16:creationId xmlns:a16="http://schemas.microsoft.com/office/drawing/2014/main" id="{70804366-1281-4181-972E-4E0D2095B867}"/>
-              </a:ext>
-            </a:extLst>
-          </p:cNvPr>
-          <p:cNvSpPr>
-            <a:spLocks noGrp="1"/>
-          </p:cNvSpPr>
-          <p:nvPr>
-            <p:ph idx="1"/>
-          </p:nvPr>
-        </p:nvSpPr>
-        <p:spPr>
-          <a:xfrm>
-            <a:off x="497651" y="2267762"/>
-            <a:ext cx="10658029" cy="4023360"/>
-          </a:xfrm>
-        </p:spPr>
-        <p:txBody>
-          <a:bodyPr>
-            <a:normAutofit/>
-          </a:bodyPr>
-          <a:lstStyle/>
-          <a:p>
-            <a:pPr marL="749808" lvl="4" indent="0">
-              <a:buNone/>
-            </a:pPr>
-            <a:r>
-              <a:rPr lang="de-DE" sz="7200" dirty="0"/>
-              <a:t>Download </a:t>
-            </a:r>
-            <a:r>
-              <a:rPr lang="de-DE" sz="7200" dirty="0" err="1"/>
-              <a:t>the</a:t>
-            </a:r>
-            <a:r>
-              <a:rPr lang="de-DE" sz="7200" dirty="0"/>
-              <a:t> Repository:</a:t>
-            </a:r>
-          </a:p>
-          <a:p>
-            <a:pPr marL="749808" lvl="4" indent="0">
-              <a:buNone/>
-            </a:pPr>
-            <a:endParaRPr lang="de-DE" sz="7200" dirty="0"/>
-          </a:p>
-          <a:p>
-            <a:pPr marL="749808" lvl="4" indent="0">
-              <a:buNone/>
-            </a:pPr>
-            <a:r>
-              <a:rPr lang="de-DE" sz="4000" b="1" dirty="0">
-                <a:solidFill>
-                  <a:schemeClr val="bg2">
-                    <a:lumMod val="50000"/>
-                  </a:schemeClr>
-                </a:solidFill>
-              </a:rPr>
-              <a:t>https://github.com/sebivenlo/PostgREST2019</a:t>
-            </a:r>
-          </a:p>
-        </p:txBody>
-      </p:sp>
-    </p:spTree>
-    <p:extLst>
-      <p:ext uri="{BB962C8B-B14F-4D97-AF65-F5344CB8AC3E}">
-        <p14:creationId xmlns:p14="http://schemas.microsoft.com/office/powerpoint/2010/main" val="3509973279"/>
-      </p:ext>
-    </p:extLst>
-  </p:cSld>
-  <p:clrMapOvr>
-    <a:masterClrMapping/>
-  </p:clrMapOvr>
-</p:sld>
-</file>
-
-<file path=ppt/slides/slide20.xml><?xml version="1.0" encoding="utf-8"?>
-<p:sld xmlns:a="http://schemas.openxmlformats.org/drawingml/2006/main" xmlns:r="http://schemas.openxmlformats.org/officeDocument/2006/relationships" xmlns:p="http://schemas.openxmlformats.org/presentationml/2006/main">
-  <p:cSld>
-    <p:spTree>
-      <p:nvGrpSpPr>
-        <p:cNvPr id="1" name=""/>
-        <p:cNvGrpSpPr/>
-        <p:nvPr/>
-      </p:nvGrpSpPr>
-      <p:grpSpPr>
-        <a:xfrm>
-          <a:off x="0" y="0"/>
-          <a:ext cx="0" cy="0"/>
-          <a:chOff x="0" y="0"/>
-          <a:chExt cx="0" cy="0"/>
-        </a:xfrm>
-      </p:grpSpPr>
-      <p:sp>
-        <p:nvSpPr>
-          <p:cNvPr id="2" name="Titel 1">
-            <a:extLst>
-              <a:ext uri="{FF2B5EF4-FFF2-40B4-BE49-F238E27FC236}">
-                <a16:creationId xmlns:a16="http://schemas.microsoft.com/office/drawing/2014/main" id="{7290E42A-69C7-4A22-8F14-E6BE7ADEE31D}"/>
-              </a:ext>
-            </a:extLst>
-          </p:cNvPr>
-          <p:cNvSpPr>
-            <a:spLocks noGrp="1"/>
-          </p:cNvSpPr>
-          <p:nvPr>
-            <p:ph type="title"/>
-          </p:nvPr>
-        </p:nvSpPr>
-        <p:spPr/>
-        <p:txBody>
-          <a:bodyPr/>
-          <a:lstStyle/>
-          <a:p>
-            <a:r>
-              <a:rPr lang="de-DE" dirty="0"/>
-              <a:t>But </a:t>
-            </a:r>
-            <a:r>
-              <a:rPr lang="de-DE" dirty="0" err="1"/>
-              <a:t>now</a:t>
-            </a:r>
-            <a:r>
-              <a:rPr lang="de-DE" dirty="0"/>
-              <a:t> </a:t>
-            </a:r>
-            <a:r>
-              <a:rPr lang="de-DE" dirty="0" err="1"/>
-              <a:t>its</a:t>
-            </a:r>
-            <a:r>
-              <a:rPr lang="de-DE" dirty="0"/>
-              <a:t> not </a:t>
-            </a:r>
-            <a:r>
-              <a:rPr lang="de-DE" dirty="0" err="1"/>
-              <a:t>ordered</a:t>
-            </a:r>
-            <a:r>
-              <a:rPr lang="de-DE" dirty="0"/>
-              <a:t> </a:t>
-            </a:r>
-            <a:r>
-              <a:rPr lang="de-DE" dirty="0" err="1"/>
-              <a:t>anymore</a:t>
-            </a:r>
-            <a:r>
-              <a:rPr lang="de-DE" dirty="0"/>
-              <a:t>!</a:t>
-            </a:r>
-          </a:p>
-        </p:txBody>
-      </p:sp>
-      <p:sp>
-        <p:nvSpPr>
-          <p:cNvPr id="4" name="Foliennummernplatzhalter 3">
-            <a:extLst>
-              <a:ext uri="{FF2B5EF4-FFF2-40B4-BE49-F238E27FC236}">
-                <a16:creationId xmlns:a16="http://schemas.microsoft.com/office/drawing/2014/main" id="{59DAD071-9C07-4592-91EB-7BE35ACEF0E5}"/>
-              </a:ext>
-            </a:extLst>
-          </p:cNvPr>
-          <p:cNvSpPr>
-            <a:spLocks noGrp="1"/>
-          </p:cNvSpPr>
-          <p:nvPr>
-            <p:ph type="sldNum" sz="quarter" idx="12"/>
-          </p:nvPr>
-        </p:nvSpPr>
-        <p:spPr>
-          <a:xfrm>
-            <a:off x="9900459" y="6459785"/>
-            <a:ext cx="1299522" cy="365125"/>
-          </a:xfrm>
-        </p:spPr>
-        <p:txBody>
-          <a:bodyPr/>
-          <a:lstStyle/>
-          <a:p>
-            <a:fld id="{D8C4CF5F-7A5F-4ACB-87CC-3EAB525DB293}" type="slidenum">
-              <a:rPr lang="de-DE" sz="2800" smtClean="0"/>
-              <a:t>20</a:t>
-            </a:fld>
-            <a:endParaRPr lang="de-DE" sz="2800" dirty="0"/>
-          </a:p>
-        </p:txBody>
-      </p:sp>
-      <p:sp>
-        <p:nvSpPr>
-          <p:cNvPr id="5" name="Inhaltsplatzhalter 4">
-            <a:extLst>
-              <a:ext uri="{FF2B5EF4-FFF2-40B4-BE49-F238E27FC236}">
-                <a16:creationId xmlns:a16="http://schemas.microsoft.com/office/drawing/2014/main" id="{A4044B80-B8A5-4196-A140-B2E264671A70}"/>
-              </a:ext>
-            </a:extLst>
-          </p:cNvPr>
-          <p:cNvSpPr>
-            <a:spLocks noGrp="1"/>
-          </p:cNvSpPr>
-          <p:nvPr>
-            <p:ph idx="1"/>
-          </p:nvPr>
-        </p:nvSpPr>
-        <p:spPr>
-          <a:xfrm>
-            <a:off x="1097280" y="1845734"/>
-            <a:ext cx="10058400" cy="4023360"/>
-          </a:xfrm>
-        </p:spPr>
-        <p:txBody>
-          <a:bodyPr>
-            <a:normAutofit lnSpcReduction="10000"/>
-          </a:bodyPr>
-          <a:lstStyle/>
-          <a:p>
-            <a:r>
-              <a:rPr lang="de-DE" sz="3600" dirty="0"/>
-              <a:t>The </a:t>
-            </a:r>
-            <a:r>
-              <a:rPr lang="de-DE" sz="3600" dirty="0" err="1"/>
-              <a:t>postgREST</a:t>
-            </a:r>
-            <a:r>
-              <a:rPr lang="de-DE" sz="3600" dirty="0"/>
-              <a:t> API </a:t>
-            </a:r>
-            <a:r>
-              <a:rPr lang="de-DE" sz="3600" dirty="0" err="1"/>
-              <a:t>allows</a:t>
-            </a:r>
-            <a:r>
-              <a:rPr lang="de-DE" sz="3600" dirty="0"/>
-              <a:t> </a:t>
-            </a:r>
-            <a:r>
-              <a:rPr lang="de-DE" sz="3600" dirty="0" err="1"/>
-              <a:t>for</a:t>
-            </a:r>
-            <a:r>
-              <a:rPr lang="de-DE" sz="3600" dirty="0"/>
-              <a:t> </a:t>
-            </a:r>
-            <a:r>
-              <a:rPr lang="de-DE" sz="3600" dirty="0" err="1"/>
-              <a:t>table</a:t>
-            </a:r>
-            <a:r>
-              <a:rPr lang="de-DE" sz="3600" dirty="0"/>
-              <a:t> </a:t>
-            </a:r>
-            <a:r>
-              <a:rPr lang="de-DE" sz="3600" dirty="0" err="1"/>
-              <a:t>manipulation</a:t>
-            </a:r>
-            <a:r>
-              <a:rPr lang="de-DE" sz="3600" dirty="0"/>
-              <a:t> via </a:t>
-            </a:r>
-            <a:r>
-              <a:rPr lang="de-DE" sz="3600" dirty="0" err="1"/>
-              <a:t>the</a:t>
-            </a:r>
-            <a:r>
-              <a:rPr lang="de-DE" sz="3600" dirty="0"/>
-              <a:t> URL</a:t>
-            </a:r>
-            <a:br>
-              <a:rPr lang="de-DE" sz="3600" dirty="0"/>
-            </a:br>
-            <a:br>
-              <a:rPr lang="de-DE" sz="3600" dirty="0"/>
-            </a:br>
-            <a:r>
-              <a:rPr lang="de-DE" sz="3600" dirty="0" err="1"/>
-              <a:t>For</a:t>
-            </a:r>
-            <a:r>
-              <a:rPr lang="de-DE" sz="3600" dirty="0"/>
-              <a:t> </a:t>
-            </a:r>
-            <a:r>
-              <a:rPr lang="de-DE" sz="3600" dirty="0" err="1"/>
-              <a:t>example</a:t>
-            </a:r>
-            <a:r>
-              <a:rPr lang="de-DE" sz="3600" dirty="0"/>
-              <a:t> </a:t>
-            </a:r>
-            <a:r>
-              <a:rPr lang="de-DE" sz="3600" dirty="0" err="1"/>
-              <a:t>the</a:t>
-            </a:r>
-            <a:r>
-              <a:rPr lang="de-DE" sz="3600" dirty="0"/>
-              <a:t> ?</a:t>
-            </a:r>
-            <a:r>
-              <a:rPr lang="de-DE" sz="3600" dirty="0" err="1"/>
-              <a:t>period</a:t>
-            </a:r>
-            <a:r>
-              <a:rPr lang="de-DE" sz="3600" dirty="0"/>
-              <a:t>=eq.1 </a:t>
-            </a:r>
-            <a:r>
-              <a:rPr lang="de-DE" sz="3600" dirty="0" err="1"/>
-              <a:t>to</a:t>
-            </a:r>
-            <a:r>
-              <a:rPr lang="de-DE" sz="3600" dirty="0"/>
-              <a:t> </a:t>
-            </a:r>
-            <a:r>
-              <a:rPr lang="de-DE" sz="3600" dirty="0" err="1"/>
-              <a:t>look</a:t>
-            </a:r>
-            <a:r>
-              <a:rPr lang="de-DE" sz="3600" dirty="0"/>
-              <a:t> </a:t>
-            </a:r>
-            <a:r>
-              <a:rPr lang="de-DE" sz="3600" dirty="0" err="1"/>
-              <a:t>for</a:t>
-            </a:r>
-            <a:r>
-              <a:rPr lang="de-DE" sz="3600" dirty="0"/>
-              <a:t> </a:t>
-            </a:r>
-            <a:r>
-              <a:rPr lang="de-DE" sz="3600" dirty="0" err="1"/>
-              <a:t>the</a:t>
-            </a:r>
-            <a:r>
-              <a:rPr lang="de-DE" sz="3600" dirty="0"/>
-              <a:t> </a:t>
-            </a:r>
-            <a:r>
-              <a:rPr lang="de-DE" sz="3600" dirty="0" err="1"/>
-              <a:t>period</a:t>
-            </a:r>
-            <a:r>
-              <a:rPr lang="de-DE" sz="3600" dirty="0"/>
-              <a:t> </a:t>
-            </a:r>
-            <a:r>
-              <a:rPr lang="de-DE" sz="3600" dirty="0" err="1"/>
-              <a:t>that</a:t>
-            </a:r>
-            <a:r>
-              <a:rPr lang="de-DE" sz="3600" dirty="0"/>
-              <a:t> </a:t>
-            </a:r>
-            <a:r>
-              <a:rPr lang="de-DE" sz="3600" dirty="0" err="1"/>
-              <a:t>is</a:t>
-            </a:r>
-            <a:r>
-              <a:rPr lang="de-DE" sz="3600" dirty="0"/>
-              <a:t> 1</a:t>
-            </a:r>
-            <a:br>
-              <a:rPr lang="de-DE" sz="3600" dirty="0"/>
-            </a:br>
-            <a:br>
-              <a:rPr lang="de-DE" sz="3600" dirty="0"/>
-            </a:br>
-            <a:r>
-              <a:rPr lang="de-DE" sz="3600" dirty="0"/>
-              <a:t>Try </a:t>
-            </a:r>
-            <a:r>
-              <a:rPr lang="de-DE" sz="3600" dirty="0" err="1"/>
-              <a:t>entering</a:t>
-            </a:r>
-            <a:r>
-              <a:rPr lang="de-DE" sz="3600" dirty="0"/>
-              <a:t> </a:t>
-            </a:r>
-            <a:r>
-              <a:rPr lang="de-DE" sz="3600" b="1" dirty="0"/>
-              <a:t>http://localhost:3000/timetable?order=period.asc</a:t>
-            </a:r>
-          </a:p>
-        </p:txBody>
-      </p:sp>
-    </p:spTree>
-    <p:extLst>
-      <p:ext uri="{BB962C8B-B14F-4D97-AF65-F5344CB8AC3E}">
-        <p14:creationId xmlns:p14="http://schemas.microsoft.com/office/powerpoint/2010/main" val="2934275846"/>
-      </p:ext>
-    </p:extLst>
-  </p:cSld>
-  <p:clrMapOvr>
-    <a:masterClrMapping/>
-  </p:clrMapOvr>
-</p:sld>
-</file>
-
 <file path=ppt/slides/slide21.xml><?xml version="1.0" encoding="utf-8"?>
 <p:sld xmlns:a="http://schemas.openxmlformats.org/drawingml/2006/main" xmlns:r="http://schemas.openxmlformats.org/officeDocument/2006/relationships" xmlns:p="http://schemas.openxmlformats.org/presentationml/2006/main">
   <p:cSld>
@@ -11471,6 +11624,654 @@
           <p:cNvPr id="2" name="Titel 1">
             <a:extLst>
               <a:ext uri="{FF2B5EF4-FFF2-40B4-BE49-F238E27FC236}">
+                <a16:creationId xmlns:a16="http://schemas.microsoft.com/office/drawing/2014/main" id="{7290E42A-69C7-4A22-8F14-E6BE7ADEE31D}"/>
+              </a:ext>
+            </a:extLst>
+          </p:cNvPr>
+          <p:cNvSpPr>
+            <a:spLocks noGrp="1"/>
+          </p:cNvSpPr>
+          <p:nvPr>
+            <p:ph type="title"/>
+          </p:nvPr>
+        </p:nvSpPr>
+        <p:spPr/>
+        <p:txBody>
+          <a:bodyPr/>
+          <a:lstStyle/>
+          <a:p>
+            <a:r>
+              <a:rPr lang="de-DE" dirty="0"/>
+              <a:t>But </a:t>
+            </a:r>
+            <a:r>
+              <a:rPr lang="de-DE" dirty="0" err="1"/>
+              <a:t>now</a:t>
+            </a:r>
+            <a:r>
+              <a:rPr lang="de-DE" dirty="0"/>
+              <a:t> </a:t>
+            </a:r>
+            <a:r>
+              <a:rPr lang="de-DE" dirty="0" err="1"/>
+              <a:t>its</a:t>
+            </a:r>
+            <a:r>
+              <a:rPr lang="de-DE" dirty="0"/>
+              <a:t> not </a:t>
+            </a:r>
+            <a:r>
+              <a:rPr lang="de-DE" dirty="0" err="1"/>
+              <a:t>ordered</a:t>
+            </a:r>
+            <a:r>
+              <a:rPr lang="de-DE" dirty="0"/>
+              <a:t> </a:t>
+            </a:r>
+            <a:r>
+              <a:rPr lang="de-DE" dirty="0" err="1"/>
+              <a:t>anymore</a:t>
+            </a:r>
+            <a:r>
+              <a:rPr lang="de-DE" dirty="0"/>
+              <a:t>!</a:t>
+            </a:r>
+          </a:p>
+        </p:txBody>
+      </p:sp>
+      <p:sp>
+        <p:nvSpPr>
+          <p:cNvPr id="4" name="Foliennummernplatzhalter 3">
+            <a:extLst>
+              <a:ext uri="{FF2B5EF4-FFF2-40B4-BE49-F238E27FC236}">
+                <a16:creationId xmlns:a16="http://schemas.microsoft.com/office/drawing/2014/main" id="{59DAD071-9C07-4592-91EB-7BE35ACEF0E5}"/>
+              </a:ext>
+            </a:extLst>
+          </p:cNvPr>
+          <p:cNvSpPr>
+            <a:spLocks noGrp="1"/>
+          </p:cNvSpPr>
+          <p:nvPr>
+            <p:ph type="sldNum" sz="quarter" idx="12"/>
+          </p:nvPr>
+        </p:nvSpPr>
+        <p:spPr>
+          <a:xfrm>
+            <a:off x="9900459" y="6459785"/>
+            <a:ext cx="1299522" cy="365125"/>
+          </a:xfrm>
+        </p:spPr>
+        <p:txBody>
+          <a:bodyPr/>
+          <a:lstStyle/>
+          <a:p>
+            <a:fld id="{D8C4CF5F-7A5F-4ACB-87CC-3EAB525DB293}" type="slidenum">
+              <a:rPr lang="de-DE" sz="2800" smtClean="0"/>
+              <a:t>21</a:t>
+            </a:fld>
+            <a:endParaRPr lang="de-DE" sz="2800" dirty="0"/>
+          </a:p>
+        </p:txBody>
+      </p:sp>
+      <p:sp>
+        <p:nvSpPr>
+          <p:cNvPr id="5" name="Inhaltsplatzhalter 4">
+            <a:extLst>
+              <a:ext uri="{FF2B5EF4-FFF2-40B4-BE49-F238E27FC236}">
+                <a16:creationId xmlns:a16="http://schemas.microsoft.com/office/drawing/2014/main" id="{A4044B80-B8A5-4196-A140-B2E264671A70}"/>
+              </a:ext>
+            </a:extLst>
+          </p:cNvPr>
+          <p:cNvSpPr>
+            <a:spLocks noGrp="1"/>
+          </p:cNvSpPr>
+          <p:nvPr>
+            <p:ph idx="1"/>
+          </p:nvPr>
+        </p:nvSpPr>
+        <p:spPr>
+          <a:xfrm>
+            <a:off x="1097280" y="1845734"/>
+            <a:ext cx="10058400" cy="4023360"/>
+          </a:xfrm>
+        </p:spPr>
+        <p:txBody>
+          <a:bodyPr>
+            <a:normAutofit lnSpcReduction="10000"/>
+          </a:bodyPr>
+          <a:lstStyle/>
+          <a:p>
+            <a:r>
+              <a:rPr lang="de-DE" sz="3600" dirty="0"/>
+              <a:t>The </a:t>
+            </a:r>
+            <a:r>
+              <a:rPr lang="de-DE" sz="3600" dirty="0" err="1"/>
+              <a:t>postgREST</a:t>
+            </a:r>
+            <a:r>
+              <a:rPr lang="de-DE" sz="3600" dirty="0"/>
+              <a:t> API </a:t>
+            </a:r>
+            <a:r>
+              <a:rPr lang="de-DE" sz="3600" dirty="0" err="1"/>
+              <a:t>allows</a:t>
+            </a:r>
+            <a:r>
+              <a:rPr lang="de-DE" sz="3600" dirty="0"/>
+              <a:t> </a:t>
+            </a:r>
+            <a:r>
+              <a:rPr lang="de-DE" sz="3600" dirty="0" err="1"/>
+              <a:t>us</a:t>
+            </a:r>
+            <a:r>
+              <a:rPr lang="de-DE" sz="3600" dirty="0"/>
+              <a:t> </a:t>
+            </a:r>
+            <a:r>
+              <a:rPr lang="de-DE" sz="3600" dirty="0" err="1"/>
+              <a:t>to</a:t>
+            </a:r>
+            <a:r>
+              <a:rPr lang="de-DE" sz="3600" dirty="0"/>
+              <a:t> </a:t>
+            </a:r>
+            <a:r>
+              <a:rPr lang="de-DE" sz="3600" dirty="0" err="1"/>
+              <a:t>translate</a:t>
+            </a:r>
+            <a:r>
+              <a:rPr lang="de-DE" sz="3600" dirty="0"/>
+              <a:t> a HTTP </a:t>
+            </a:r>
+            <a:r>
+              <a:rPr lang="de-DE" sz="3600" dirty="0" err="1"/>
+              <a:t>request</a:t>
+            </a:r>
+            <a:r>
+              <a:rPr lang="de-DE" sz="3600" dirty="0"/>
+              <a:t> </a:t>
+            </a:r>
+            <a:r>
+              <a:rPr lang="de-DE" sz="3600" dirty="0" err="1"/>
+              <a:t>into</a:t>
+            </a:r>
+            <a:r>
+              <a:rPr lang="de-DE" sz="3600" dirty="0"/>
+              <a:t> SQL</a:t>
+            </a:r>
+            <a:br>
+              <a:rPr lang="de-DE" sz="3600" dirty="0"/>
+            </a:br>
+            <a:br>
+              <a:rPr lang="de-DE" sz="3600" dirty="0"/>
+            </a:br>
+            <a:r>
+              <a:rPr lang="de-DE" sz="3600" dirty="0" err="1"/>
+              <a:t>For</a:t>
+            </a:r>
+            <a:r>
+              <a:rPr lang="de-DE" sz="3600" dirty="0"/>
+              <a:t> </a:t>
+            </a:r>
+            <a:r>
+              <a:rPr lang="de-DE" sz="3600" dirty="0" err="1"/>
+              <a:t>example</a:t>
+            </a:r>
+            <a:r>
+              <a:rPr lang="de-DE" sz="3600" dirty="0"/>
+              <a:t> </a:t>
+            </a:r>
+            <a:r>
+              <a:rPr lang="de-DE" sz="3600" dirty="0" err="1"/>
+              <a:t>the</a:t>
+            </a:r>
+            <a:r>
+              <a:rPr lang="de-DE" sz="3600" dirty="0"/>
+              <a:t> </a:t>
+            </a:r>
+            <a:r>
+              <a:rPr lang="de-DE" sz="3600" b="1" dirty="0"/>
+              <a:t>?</a:t>
+            </a:r>
+            <a:r>
+              <a:rPr lang="de-DE" sz="3600" b="1" dirty="0" err="1"/>
+              <a:t>period</a:t>
+            </a:r>
+            <a:r>
+              <a:rPr lang="de-DE" sz="3600" b="1" dirty="0"/>
+              <a:t>=eq.1</a:t>
+            </a:r>
+            <a:r>
+              <a:rPr lang="de-DE" sz="3600" dirty="0"/>
+              <a:t> </a:t>
+            </a:r>
+            <a:r>
+              <a:rPr lang="de-DE" sz="3600" dirty="0" err="1"/>
+              <a:t>to</a:t>
+            </a:r>
+            <a:r>
+              <a:rPr lang="de-DE" sz="3600" dirty="0"/>
+              <a:t> </a:t>
+            </a:r>
+            <a:r>
+              <a:rPr lang="de-DE" sz="3600" dirty="0" err="1"/>
+              <a:t>filter</a:t>
+            </a:r>
+            <a:r>
+              <a:rPr lang="de-DE" sz="3600" dirty="0"/>
+              <a:t> </a:t>
+            </a:r>
+            <a:r>
+              <a:rPr lang="de-DE" sz="3600" dirty="0" err="1"/>
+              <a:t>based</a:t>
+            </a:r>
+            <a:r>
+              <a:rPr lang="de-DE" sz="3600" dirty="0"/>
+              <a:t> on </a:t>
+            </a:r>
+            <a:r>
+              <a:rPr lang="de-DE" sz="3600" dirty="0" err="1"/>
+              <a:t>the</a:t>
+            </a:r>
+            <a:r>
+              <a:rPr lang="de-DE" sz="3600" dirty="0"/>
+              <a:t> </a:t>
+            </a:r>
+            <a:r>
+              <a:rPr lang="de-DE" sz="3600" dirty="0" err="1"/>
+              <a:t>period</a:t>
+            </a:r>
+            <a:r>
+              <a:rPr lang="de-DE" sz="3600" dirty="0"/>
+              <a:t> </a:t>
+            </a:r>
+            <a:r>
+              <a:rPr lang="de-DE" sz="3600" dirty="0" err="1"/>
+              <a:t>is</a:t>
+            </a:r>
+            <a:r>
+              <a:rPr lang="de-DE" sz="3600" dirty="0"/>
+              <a:t> </a:t>
+            </a:r>
+            <a:r>
+              <a:rPr lang="de-DE" sz="3600" dirty="0" err="1"/>
+              <a:t>equal</a:t>
+            </a:r>
+            <a:r>
+              <a:rPr lang="de-DE" sz="3600" dirty="0"/>
+              <a:t> </a:t>
+            </a:r>
+            <a:r>
+              <a:rPr lang="de-DE" sz="3600" dirty="0" err="1"/>
+              <a:t>to</a:t>
+            </a:r>
+            <a:r>
+              <a:rPr lang="de-DE" sz="3600" dirty="0"/>
+              <a:t> </a:t>
+            </a:r>
+            <a:r>
+              <a:rPr lang="de-DE" sz="3600" b="1" dirty="0" err="1"/>
+              <a:t>Where</a:t>
+            </a:r>
+            <a:r>
+              <a:rPr lang="de-DE" sz="3600" b="1" dirty="0"/>
+              <a:t> </a:t>
+            </a:r>
+            <a:r>
+              <a:rPr lang="de-DE" sz="3600" b="1" dirty="0" err="1"/>
+              <a:t>period</a:t>
+            </a:r>
+            <a:r>
+              <a:rPr lang="de-DE" sz="3600" b="1" dirty="0"/>
+              <a:t> = 1</a:t>
+            </a:r>
+            <a:br>
+              <a:rPr lang="de-DE" sz="3600" b="1" dirty="0"/>
+            </a:br>
+            <a:br>
+              <a:rPr lang="de-DE" sz="3600" dirty="0"/>
+            </a:br>
+            <a:r>
+              <a:rPr lang="de-DE" sz="3600" dirty="0"/>
+              <a:t>Try </a:t>
+            </a:r>
+            <a:r>
+              <a:rPr lang="de-DE" sz="3600" dirty="0" err="1"/>
+              <a:t>entering</a:t>
+            </a:r>
+            <a:r>
+              <a:rPr lang="de-DE" sz="3600" dirty="0"/>
+              <a:t> </a:t>
+            </a:r>
+            <a:r>
+              <a:rPr lang="de-DE" sz="3600" b="1" dirty="0"/>
+              <a:t>http://localhost:3000/timetable?order=period.asc</a:t>
+            </a:r>
+          </a:p>
+        </p:txBody>
+      </p:sp>
+    </p:spTree>
+    <p:extLst>
+      <p:ext uri="{BB962C8B-B14F-4D97-AF65-F5344CB8AC3E}">
+        <p14:creationId xmlns:p14="http://schemas.microsoft.com/office/powerpoint/2010/main" val="2934275846"/>
+      </p:ext>
+    </p:extLst>
+  </p:cSld>
+  <p:clrMapOvr>
+    <a:masterClrMapping/>
+  </p:clrMapOvr>
+</p:sld>
+</file>
+
+<file path=ppt/slides/slide22.xml><?xml version="1.0" encoding="utf-8"?>
+<p:sld xmlns:a="http://schemas.openxmlformats.org/drawingml/2006/main" xmlns:r="http://schemas.openxmlformats.org/officeDocument/2006/relationships" xmlns:p="http://schemas.openxmlformats.org/presentationml/2006/main">
+  <p:cSld>
+    <p:spTree>
+      <p:nvGrpSpPr>
+        <p:cNvPr id="1" name=""/>
+        <p:cNvGrpSpPr/>
+        <p:nvPr/>
+      </p:nvGrpSpPr>
+      <p:grpSpPr>
+        <a:xfrm>
+          <a:off x="0" y="0"/>
+          <a:ext cx="0" cy="0"/>
+          <a:chOff x="0" y="0"/>
+          <a:chExt cx="0" cy="0"/>
+        </a:xfrm>
+      </p:grpSpPr>
+      <p:sp>
+        <p:nvSpPr>
+          <p:cNvPr id="2" name="Titel 1">
+            <a:extLst>
+              <a:ext uri="{FF2B5EF4-FFF2-40B4-BE49-F238E27FC236}">
+                <a16:creationId xmlns:a16="http://schemas.microsoft.com/office/drawing/2014/main" id="{7290E42A-69C7-4A22-8F14-E6BE7ADEE31D}"/>
+              </a:ext>
+            </a:extLst>
+          </p:cNvPr>
+          <p:cNvSpPr>
+            <a:spLocks noGrp="1"/>
+          </p:cNvSpPr>
+          <p:nvPr>
+            <p:ph type="title"/>
+          </p:nvPr>
+        </p:nvSpPr>
+        <p:spPr/>
+        <p:txBody>
+          <a:bodyPr/>
+          <a:lstStyle/>
+          <a:p>
+            <a:r>
+              <a:rPr lang="de-DE" dirty="0" err="1"/>
+              <a:t>Thats</a:t>
+            </a:r>
+            <a:r>
+              <a:rPr lang="de-DE" dirty="0"/>
+              <a:t> not all </a:t>
+            </a:r>
+            <a:r>
+              <a:rPr lang="de-DE" dirty="0" err="1"/>
+              <a:t>PostgREST</a:t>
+            </a:r>
+            <a:r>
+              <a:rPr lang="de-DE" dirty="0"/>
+              <a:t> </a:t>
+            </a:r>
+            <a:r>
+              <a:rPr lang="de-DE" dirty="0" err="1"/>
+              <a:t>can</a:t>
+            </a:r>
+            <a:r>
+              <a:rPr lang="de-DE" dirty="0"/>
+              <a:t> do </a:t>
+            </a:r>
+            <a:r>
+              <a:rPr lang="de-DE" dirty="0" err="1"/>
+              <a:t>ofcourse</a:t>
+            </a:r>
+            <a:endParaRPr lang="de-DE" dirty="0"/>
+          </a:p>
+        </p:txBody>
+      </p:sp>
+      <p:sp>
+        <p:nvSpPr>
+          <p:cNvPr id="4" name="Foliennummernplatzhalter 3">
+            <a:extLst>
+              <a:ext uri="{FF2B5EF4-FFF2-40B4-BE49-F238E27FC236}">
+                <a16:creationId xmlns:a16="http://schemas.microsoft.com/office/drawing/2014/main" id="{59DAD071-9C07-4592-91EB-7BE35ACEF0E5}"/>
+              </a:ext>
+            </a:extLst>
+          </p:cNvPr>
+          <p:cNvSpPr>
+            <a:spLocks noGrp="1"/>
+          </p:cNvSpPr>
+          <p:nvPr>
+            <p:ph type="sldNum" sz="quarter" idx="12"/>
+          </p:nvPr>
+        </p:nvSpPr>
+        <p:spPr>
+          <a:xfrm>
+            <a:off x="9900459" y="6459785"/>
+            <a:ext cx="1299522" cy="365125"/>
+          </a:xfrm>
+        </p:spPr>
+        <p:txBody>
+          <a:bodyPr/>
+          <a:lstStyle/>
+          <a:p>
+            <a:fld id="{D8C4CF5F-7A5F-4ACB-87CC-3EAB525DB293}" type="slidenum">
+              <a:rPr lang="de-DE" sz="2800" smtClean="0"/>
+              <a:t>22</a:t>
+            </a:fld>
+            <a:endParaRPr lang="de-DE" sz="2800" dirty="0"/>
+          </a:p>
+        </p:txBody>
+      </p:sp>
+      <p:sp>
+        <p:nvSpPr>
+          <p:cNvPr id="5" name="Inhaltsplatzhalter 4">
+            <a:extLst>
+              <a:ext uri="{FF2B5EF4-FFF2-40B4-BE49-F238E27FC236}">
+                <a16:creationId xmlns:a16="http://schemas.microsoft.com/office/drawing/2014/main" id="{A4044B80-B8A5-4196-A140-B2E264671A70}"/>
+              </a:ext>
+            </a:extLst>
+          </p:cNvPr>
+          <p:cNvSpPr>
+            <a:spLocks noGrp="1"/>
+          </p:cNvSpPr>
+          <p:nvPr>
+            <p:ph idx="1"/>
+          </p:nvPr>
+        </p:nvSpPr>
+        <p:spPr>
+          <a:xfrm>
+            <a:off x="1097280" y="1845734"/>
+            <a:ext cx="10058400" cy="4023360"/>
+          </a:xfrm>
+        </p:spPr>
+        <p:txBody>
+          <a:bodyPr>
+            <a:normAutofit lnSpcReduction="10000"/>
+          </a:bodyPr>
+          <a:lstStyle/>
+          <a:p>
+            <a:r>
+              <a:rPr lang="de-DE" sz="3600" dirty="0"/>
+              <a:t>- </a:t>
+            </a:r>
+            <a:r>
+              <a:rPr lang="de-DE" sz="3600" dirty="0" err="1"/>
+              <a:t>Querry</a:t>
+            </a:r>
+            <a:r>
+              <a:rPr lang="de-DE" sz="3600" dirty="0"/>
+              <a:t> </a:t>
+            </a:r>
+            <a:r>
+              <a:rPr lang="de-DE" sz="3600" dirty="0" err="1"/>
+              <a:t>data</a:t>
+            </a:r>
+            <a:endParaRPr lang="de-DE" sz="3600" dirty="0"/>
+          </a:p>
+          <a:p>
+            <a:r>
+              <a:rPr lang="de-DE" sz="3600" dirty="0"/>
+              <a:t>- Call </a:t>
+            </a:r>
+            <a:r>
+              <a:rPr lang="de-DE" sz="3600" dirty="0" err="1"/>
+              <a:t>stored</a:t>
+            </a:r>
+            <a:r>
+              <a:rPr lang="de-DE" sz="3600" dirty="0"/>
+              <a:t> </a:t>
+            </a:r>
+            <a:r>
+              <a:rPr lang="de-DE" sz="3600" dirty="0" err="1"/>
+              <a:t>procedures</a:t>
+            </a:r>
+            <a:r>
+              <a:rPr lang="de-DE" sz="3600" dirty="0"/>
+              <a:t> via http </a:t>
+            </a:r>
+            <a:r>
+              <a:rPr lang="de-DE" sz="3600" dirty="0" err="1"/>
+              <a:t>requests</a:t>
+            </a:r>
+            <a:endParaRPr lang="de-DE" sz="3600" dirty="0"/>
+          </a:p>
+          <a:p>
+            <a:r>
+              <a:rPr lang="de-DE" sz="3600" dirty="0"/>
+              <a:t>- Different </a:t>
+            </a:r>
+            <a:r>
+              <a:rPr lang="de-DE" sz="3600" dirty="0" err="1"/>
+              <a:t>ways</a:t>
+            </a:r>
+            <a:r>
+              <a:rPr lang="de-DE" sz="3600" dirty="0"/>
+              <a:t> </a:t>
+            </a:r>
+            <a:r>
+              <a:rPr lang="de-DE" sz="3600" dirty="0" err="1"/>
+              <a:t>to</a:t>
+            </a:r>
+            <a:r>
+              <a:rPr lang="de-DE" sz="3600" dirty="0"/>
+              <a:t> </a:t>
+            </a:r>
+            <a:r>
+              <a:rPr lang="de-DE" sz="3600" dirty="0" err="1"/>
+              <a:t>hand</a:t>
+            </a:r>
+            <a:r>
+              <a:rPr lang="de-DE" sz="3600" dirty="0"/>
+              <a:t> </a:t>
+            </a:r>
+            <a:r>
+              <a:rPr lang="de-DE" sz="3600" dirty="0" err="1"/>
+              <a:t>webtokens</a:t>
+            </a:r>
+            <a:endParaRPr lang="de-DE" sz="3600" dirty="0"/>
+          </a:p>
+          <a:p>
+            <a:r>
+              <a:rPr lang="de-DE" sz="3600" dirty="0"/>
+              <a:t>- And </a:t>
+            </a:r>
+            <a:r>
+              <a:rPr lang="de-DE" sz="3600" dirty="0" err="1"/>
+              <a:t>much</a:t>
+            </a:r>
+            <a:r>
+              <a:rPr lang="de-DE" sz="3600" dirty="0"/>
+              <a:t> </a:t>
+            </a:r>
+            <a:r>
+              <a:rPr lang="de-DE" sz="3600" dirty="0" err="1"/>
+              <a:t>more</a:t>
+            </a:r>
+            <a:r>
+              <a:rPr lang="de-DE" sz="3600" dirty="0"/>
+              <a:t>…</a:t>
+            </a:r>
+          </a:p>
+          <a:p>
+            <a:pPr algn="ctr"/>
+            <a:br>
+              <a:rPr lang="de-DE" sz="3600" dirty="0"/>
+            </a:br>
+            <a:r>
+              <a:rPr lang="de-DE" sz="3600" dirty="0"/>
+              <a:t>Take a </a:t>
+            </a:r>
+            <a:r>
+              <a:rPr lang="de-DE" sz="3600" dirty="0" err="1"/>
+              <a:t>look</a:t>
+            </a:r>
+            <a:r>
+              <a:rPr lang="de-DE" sz="3600" dirty="0"/>
+              <a:t> </a:t>
+            </a:r>
+            <a:r>
+              <a:rPr lang="de-DE" sz="3600" dirty="0" err="1"/>
+              <a:t>yourself</a:t>
+            </a:r>
+            <a:r>
+              <a:rPr lang="de-DE" sz="3600" dirty="0"/>
+              <a:t>: </a:t>
+            </a:r>
+            <a:r>
+              <a:rPr lang="de-DE" sz="3600" b="1" dirty="0">
+                <a:solidFill>
+                  <a:schemeClr val="bg2">
+                    <a:lumMod val="50000"/>
+                  </a:schemeClr>
+                </a:solidFill>
+              </a:rPr>
+              <a:t>http://postgrest.org/en/v6.0/index.html</a:t>
+            </a:r>
+          </a:p>
+        </p:txBody>
+      </p:sp>
+    </p:spTree>
+    <p:extLst>
+      <p:ext uri="{BB962C8B-B14F-4D97-AF65-F5344CB8AC3E}">
+        <p14:creationId xmlns:p14="http://schemas.microsoft.com/office/powerpoint/2010/main" val="775191271"/>
+      </p:ext>
+    </p:extLst>
+  </p:cSld>
+  <p:clrMapOvr>
+    <a:masterClrMapping/>
+  </p:clrMapOvr>
+</p:sld>
+</file>
+
+<file path=ppt/slides/slide23.xml><?xml version="1.0" encoding="utf-8"?>
+<p:sld xmlns:a="http://schemas.openxmlformats.org/drawingml/2006/main" xmlns:r="http://schemas.openxmlformats.org/officeDocument/2006/relationships" xmlns:p="http://schemas.openxmlformats.org/presentationml/2006/main">
+  <p:cSld>
+    <p:spTree>
+      <p:nvGrpSpPr>
+        <p:cNvPr id="1" name=""/>
+        <p:cNvGrpSpPr/>
+        <p:nvPr/>
+      </p:nvGrpSpPr>
+      <p:grpSpPr>
+        <a:xfrm>
+          <a:off x="0" y="0"/>
+          <a:ext cx="0" cy="0"/>
+          <a:chOff x="0" y="0"/>
+          <a:chExt cx="0" cy="0"/>
+        </a:xfrm>
+      </p:grpSpPr>
+      <p:sp>
+        <p:nvSpPr>
+          <p:cNvPr id="2" name="Titel 1">
+            <a:extLst>
+              <a:ext uri="{FF2B5EF4-FFF2-40B4-BE49-F238E27FC236}">
                 <a16:creationId xmlns:a16="http://schemas.microsoft.com/office/drawing/2014/main" id="{867E8384-A939-42AC-9928-53BAF379284B}"/>
               </a:ext>
             </a:extLst>
@@ -11511,60 +12312,73 @@
             <p:ph idx="1"/>
           </p:nvPr>
         </p:nvSpPr>
-        <p:spPr/>
-        <p:txBody>
-          <a:bodyPr/>
-          <a:lstStyle/>
-          <a:p>
-            <a:r>
-              <a:rPr lang="en-US" dirty="0"/>
+        <p:spPr>
+          <a:xfrm>
+            <a:off x="1097280" y="1845733"/>
+            <a:ext cx="10058400" cy="4373637"/>
+          </a:xfrm>
+        </p:spPr>
+        <p:txBody>
+          <a:bodyPr>
+            <a:normAutofit lnSpcReduction="10000"/>
+          </a:bodyPr>
+          <a:lstStyle/>
+          <a:p>
+            <a:r>
+              <a:rPr lang="en-US" sz="2400" b="1" dirty="0"/>
               <a:t>Pros:</a:t>
             </a:r>
           </a:p>
           <a:p>
             <a:r>
-              <a:rPr lang="en-US" dirty="0"/>
+              <a:rPr lang="en-US" sz="2400" dirty="0"/>
+              <a:t>- Totally free</a:t>
+            </a:r>
+          </a:p>
+          <a:p>
+            <a:r>
+              <a:rPr lang="en-US" sz="2400" dirty="0"/>
               <a:t>- Fast to develop</a:t>
             </a:r>
           </a:p>
           <a:p>
             <a:r>
-              <a:rPr lang="en-US" dirty="0"/>
+              <a:rPr lang="en-US" sz="2400" dirty="0"/>
               <a:t>- Completely based on the data in the database</a:t>
             </a:r>
           </a:p>
           <a:p>
             <a:r>
-              <a:rPr lang="en-US" dirty="0"/>
+              <a:rPr lang="en-US" sz="2400" dirty="0"/>
               <a:t>- No need to duplicate database structures in code</a:t>
             </a:r>
           </a:p>
           <a:p>
             <a:r>
-              <a:rPr lang="en-US" dirty="0"/>
+              <a:rPr lang="en-US" sz="2400" dirty="0"/>
               <a:t>- No extra CRUD code or authentication needed</a:t>
             </a:r>
           </a:p>
           <a:p>
             <a:r>
-              <a:rPr lang="en-US" dirty="0"/>
+              <a:rPr lang="en-US" sz="2400" b="1" dirty="0"/>
               <a:t>Cons:</a:t>
             </a:r>
           </a:p>
           <a:p>
             <a:r>
-              <a:rPr lang="en-US" dirty="0"/>
+              <a:rPr lang="en-US" sz="2400" dirty="0"/>
               <a:t>- Only works with </a:t>
             </a:r>
             <a:r>
-              <a:rPr lang="en-US" dirty="0" err="1"/>
+              <a:rPr lang="en-US" sz="2400" dirty="0" err="1"/>
               <a:t>PostgrSQL</a:t>
             </a:r>
-            <a:endParaRPr lang="en-US" dirty="0"/>
-          </a:p>
-          <a:p>
-            <a:r>
-              <a:rPr lang="en-US" dirty="0"/>
+            <a:endParaRPr lang="en-US" sz="2400" dirty="0"/>
+          </a:p>
+          <a:p>
+            <a:r>
+              <a:rPr lang="en-US" sz="2400" dirty="0"/>
               <a:t>- It does one thing well but only that</a:t>
             </a:r>
           </a:p>
@@ -11593,7 +12407,7 @@
           <a:p>
             <a:fld id="{D8C4CF5F-7A5F-4ACB-87CC-3EAB525DB293}" type="slidenum">
               <a:rPr lang="de-DE" sz="2800" smtClean="0"/>
-              <a:t>21</a:t>
+              <a:t>23</a:t>
             </a:fld>
             <a:endParaRPr lang="de-DE" dirty="0"/>
           </a:p>
@@ -12221,11 +13035,27 @@
           <a:p>
             <a:r>
               <a:rPr lang="de-DE" dirty="0" err="1"/>
-              <a:t>Creating</a:t>
-            </a:r>
-            <a:r>
-              <a:rPr lang="de-DE" dirty="0"/>
-              <a:t> a Database</a:t>
+              <a:t>What</a:t>
+            </a:r>
+            <a:r>
+              <a:rPr lang="de-DE" dirty="0"/>
+              <a:t> </a:t>
+            </a:r>
+            <a:r>
+              <a:rPr lang="de-DE" dirty="0" err="1"/>
+              <a:t>is</a:t>
+            </a:r>
+            <a:r>
+              <a:rPr lang="de-DE" dirty="0"/>
+              <a:t> </a:t>
+            </a:r>
+            <a:r>
+              <a:rPr lang="de-DE" dirty="0" err="1"/>
+              <a:t>PostgREST</a:t>
+            </a:r>
+            <a:r>
+              <a:rPr lang="de-DE" dirty="0"/>
+              <a:t>?</a:t>
             </a:r>
           </a:p>
         </p:txBody>
@@ -12254,6 +13084,256 @@
             <a:fld id="{D8C4CF5F-7A5F-4ACB-87CC-3EAB525DB293}" type="slidenum">
               <a:rPr lang="de-DE" sz="2800" smtClean="0"/>
               <a:t>6</a:t>
+            </a:fld>
+            <a:endParaRPr lang="de-DE" sz="2800" dirty="0"/>
+          </a:p>
+        </p:txBody>
+      </p:sp>
+      <p:sp>
+        <p:nvSpPr>
+          <p:cNvPr id="5" name="Inhaltsplatzhalter 4">
+            <a:extLst>
+              <a:ext uri="{FF2B5EF4-FFF2-40B4-BE49-F238E27FC236}">
+                <a16:creationId xmlns:a16="http://schemas.microsoft.com/office/drawing/2014/main" id="{B6FF41C6-2A56-4792-B4EB-1081721BE60B}"/>
+              </a:ext>
+            </a:extLst>
+          </p:cNvPr>
+          <p:cNvSpPr>
+            <a:spLocks noGrp="1"/>
+          </p:cNvSpPr>
+          <p:nvPr>
+            <p:ph idx="1"/>
+          </p:nvPr>
+        </p:nvSpPr>
+        <p:spPr/>
+        <p:txBody>
+          <a:bodyPr>
+            <a:normAutofit/>
+          </a:bodyPr>
+          <a:lstStyle/>
+          <a:p>
+            <a:r>
+              <a:rPr lang="de-DE" sz="3200" dirty="0"/>
+              <a:t>Motivation:</a:t>
+            </a:r>
+          </a:p>
+          <a:p>
+            <a:r>
+              <a:rPr lang="de-DE" sz="3200" dirty="0"/>
+              <a:t>- Alternative </a:t>
+            </a:r>
+            <a:r>
+              <a:rPr lang="de-DE" sz="3200" dirty="0" err="1"/>
+              <a:t>to</a:t>
+            </a:r>
+            <a:r>
+              <a:rPr lang="de-DE" sz="3200" dirty="0"/>
+              <a:t> CRUD </a:t>
+            </a:r>
+            <a:r>
+              <a:rPr lang="de-DE" sz="3200" dirty="0" err="1"/>
+              <a:t>programming</a:t>
+            </a:r>
+            <a:endParaRPr lang="de-DE" sz="3200" dirty="0"/>
+          </a:p>
+          <a:p>
+            <a:r>
+              <a:rPr lang="de-DE" sz="3200" dirty="0"/>
+              <a:t>- </a:t>
+            </a:r>
+            <a:r>
+              <a:rPr lang="de-DE" sz="3200" dirty="0" err="1"/>
+              <a:t>Easier</a:t>
+            </a:r>
+            <a:r>
+              <a:rPr lang="de-DE" sz="3200" dirty="0"/>
+              <a:t> </a:t>
+            </a:r>
+            <a:r>
+              <a:rPr lang="de-DE" sz="3200" dirty="0" err="1"/>
+              <a:t>to</a:t>
+            </a:r>
+            <a:r>
+              <a:rPr lang="de-DE" sz="3200" dirty="0"/>
+              <a:t> </a:t>
+            </a:r>
+            <a:r>
+              <a:rPr lang="de-DE" sz="3200" dirty="0" err="1"/>
+              <a:t>let</a:t>
+            </a:r>
+            <a:r>
+              <a:rPr lang="de-DE" sz="3200" dirty="0"/>
+              <a:t> </a:t>
+            </a:r>
+            <a:r>
+              <a:rPr lang="de-DE" sz="3200" dirty="0" err="1"/>
+              <a:t>the</a:t>
+            </a:r>
+            <a:r>
+              <a:rPr lang="de-DE" sz="3200" dirty="0"/>
+              <a:t> </a:t>
+            </a:r>
+            <a:r>
+              <a:rPr lang="de-DE" sz="3200" dirty="0" err="1"/>
+              <a:t>database</a:t>
+            </a:r>
+            <a:r>
+              <a:rPr lang="de-DE" sz="3200" dirty="0"/>
+              <a:t> handle </a:t>
+            </a:r>
+            <a:r>
+              <a:rPr lang="de-DE" sz="3200" dirty="0" err="1"/>
+              <a:t>data</a:t>
+            </a:r>
+            <a:r>
+              <a:rPr lang="de-DE" sz="3200" dirty="0"/>
+              <a:t> </a:t>
+            </a:r>
+            <a:r>
+              <a:rPr lang="de-DE" sz="3200" dirty="0" err="1"/>
+              <a:t>access</a:t>
+            </a:r>
+            <a:endParaRPr lang="de-DE" sz="3200" dirty="0"/>
+          </a:p>
+          <a:p>
+            <a:r>
+              <a:rPr lang="de-DE" sz="3200" dirty="0"/>
+              <a:t>- </a:t>
+            </a:r>
+            <a:r>
+              <a:rPr lang="de-DE" sz="3200" dirty="0" err="1"/>
+              <a:t>Creation</a:t>
+            </a:r>
+            <a:r>
+              <a:rPr lang="de-DE" sz="3200" dirty="0"/>
+              <a:t> </a:t>
+            </a:r>
+            <a:r>
+              <a:rPr lang="de-DE" sz="3200" dirty="0" err="1"/>
+              <a:t>of</a:t>
+            </a:r>
+            <a:r>
+              <a:rPr lang="de-DE" sz="3200" dirty="0"/>
+              <a:t> an API </a:t>
+            </a:r>
+            <a:r>
+              <a:rPr lang="de-DE" sz="3200" dirty="0" err="1"/>
+              <a:t>from</a:t>
+            </a:r>
+            <a:r>
+              <a:rPr lang="de-DE" sz="3200" dirty="0"/>
+              <a:t> </a:t>
+            </a:r>
+            <a:r>
+              <a:rPr lang="de-DE" sz="3200" dirty="0" err="1"/>
+              <a:t>scratch</a:t>
+            </a:r>
+            <a:r>
+              <a:rPr lang="de-DE" sz="3200" dirty="0"/>
+              <a:t> </a:t>
+            </a:r>
+            <a:r>
+              <a:rPr lang="de-DE" sz="3200" dirty="0" err="1"/>
+              <a:t>without</a:t>
+            </a:r>
+            <a:r>
+              <a:rPr lang="de-DE" sz="3200" dirty="0"/>
+              <a:t> </a:t>
+            </a:r>
+            <a:r>
+              <a:rPr lang="de-DE" sz="3200" dirty="0" err="1"/>
+              <a:t>programming</a:t>
+            </a:r>
+            <a:endParaRPr lang="de-DE" sz="3200" dirty="0"/>
+          </a:p>
+        </p:txBody>
+      </p:sp>
+    </p:spTree>
+    <p:extLst>
+      <p:ext uri="{BB962C8B-B14F-4D97-AF65-F5344CB8AC3E}">
+        <p14:creationId xmlns:p14="http://schemas.microsoft.com/office/powerpoint/2010/main" val="87212805"/>
+      </p:ext>
+    </p:extLst>
+  </p:cSld>
+  <p:clrMapOvr>
+    <a:masterClrMapping/>
+  </p:clrMapOvr>
+</p:sld>
+</file>
+
+<file path=ppt/slides/slide7.xml><?xml version="1.0" encoding="utf-8"?>
+<p:sld xmlns:a="http://schemas.openxmlformats.org/drawingml/2006/main" xmlns:r="http://schemas.openxmlformats.org/officeDocument/2006/relationships" xmlns:p="http://schemas.openxmlformats.org/presentationml/2006/main">
+  <p:cSld>
+    <p:spTree>
+      <p:nvGrpSpPr>
+        <p:cNvPr id="1" name=""/>
+        <p:cNvGrpSpPr/>
+        <p:nvPr/>
+      </p:nvGrpSpPr>
+      <p:grpSpPr>
+        <a:xfrm>
+          <a:off x="0" y="0"/>
+          <a:ext cx="0" cy="0"/>
+          <a:chOff x="0" y="0"/>
+          <a:chExt cx="0" cy="0"/>
+        </a:xfrm>
+      </p:grpSpPr>
+      <p:sp>
+        <p:nvSpPr>
+          <p:cNvPr id="2" name="Titel 1">
+            <a:extLst>
+              <a:ext uri="{FF2B5EF4-FFF2-40B4-BE49-F238E27FC236}">
+                <a16:creationId xmlns:a16="http://schemas.microsoft.com/office/drawing/2014/main" id="{9F0A8275-5587-4187-AB79-939DBF645726}"/>
+              </a:ext>
+            </a:extLst>
+          </p:cNvPr>
+          <p:cNvSpPr>
+            <a:spLocks noGrp="1"/>
+          </p:cNvSpPr>
+          <p:nvPr>
+            <p:ph type="title"/>
+          </p:nvPr>
+        </p:nvSpPr>
+        <p:spPr/>
+        <p:txBody>
+          <a:bodyPr/>
+          <a:lstStyle/>
+          <a:p>
+            <a:r>
+              <a:rPr lang="de-DE" dirty="0" err="1"/>
+              <a:t>Creating</a:t>
+            </a:r>
+            <a:r>
+              <a:rPr lang="de-DE" dirty="0"/>
+              <a:t> a Database</a:t>
+            </a:r>
+          </a:p>
+        </p:txBody>
+      </p:sp>
+      <p:sp>
+        <p:nvSpPr>
+          <p:cNvPr id="4" name="Foliennummernplatzhalter 3">
+            <a:extLst>
+              <a:ext uri="{FF2B5EF4-FFF2-40B4-BE49-F238E27FC236}">
+                <a16:creationId xmlns:a16="http://schemas.microsoft.com/office/drawing/2014/main" id="{BD7D0363-104F-49E2-AE86-532239F687E1}"/>
+              </a:ext>
+            </a:extLst>
+          </p:cNvPr>
+          <p:cNvSpPr>
+            <a:spLocks noGrp="1"/>
+          </p:cNvSpPr>
+          <p:nvPr>
+            <p:ph type="sldNum" sz="quarter" idx="12"/>
+          </p:nvPr>
+        </p:nvSpPr>
+        <p:spPr/>
+        <p:txBody>
+          <a:bodyPr/>
+          <a:lstStyle/>
+          <a:p>
+            <a:fld id="{D8C4CF5F-7A5F-4ACB-87CC-3EAB525DB293}" type="slidenum">
+              <a:rPr lang="de-DE" sz="2800" smtClean="0"/>
+              <a:t>7</a:t>
             </a:fld>
             <a:endParaRPr lang="de-DE" sz="2800" dirty="0"/>
           </a:p>
@@ -12342,7 +13422,7 @@
 </p:sld>
 </file>
 
-<file path=ppt/slides/slide7.xml><?xml version="1.0" encoding="utf-8"?>
+<file path=ppt/slides/slide8.xml><?xml version="1.0" encoding="utf-8"?>
 <p:sld xmlns:a="http://schemas.openxmlformats.org/drawingml/2006/main" xmlns:r="http://schemas.openxmlformats.org/officeDocument/2006/relationships" xmlns:p="http://schemas.openxmlformats.org/presentationml/2006/main">
   <p:cSld>
     <p:spTree>
@@ -12414,7 +13494,7 @@
           <a:p>
             <a:fld id="{D8C4CF5F-7A5F-4ACB-87CC-3EAB525DB293}" type="slidenum">
               <a:rPr lang="de-DE" sz="2800" smtClean="0"/>
-              <a:t>7</a:t>
+              <a:t>8</a:t>
             </a:fld>
             <a:endParaRPr lang="de-DE" sz="2800" dirty="0"/>
           </a:p>
@@ -12669,7 +13749,7 @@
 </p:sld>
 </file>
 
-<file path=ppt/slides/slide8.xml><?xml version="1.0" encoding="utf-8"?>
+<file path=ppt/slides/slide9.xml><?xml version="1.0" encoding="utf-8"?>
 <p:sld xmlns:a="http://schemas.openxmlformats.org/drawingml/2006/main" xmlns:r="http://schemas.openxmlformats.org/officeDocument/2006/relationships" xmlns:p="http://schemas.openxmlformats.org/presentationml/2006/main">
   <p:cSld>
     <p:spTree>
@@ -12741,7 +13821,7 @@
           <a:p>
             <a:fld id="{D8C4CF5F-7A5F-4ACB-87CC-3EAB525DB293}" type="slidenum">
               <a:rPr lang="de-DE" sz="2800" smtClean="0"/>
-              <a:t>8</a:t>
+              <a:t>9</a:t>
             </a:fld>
             <a:endParaRPr lang="de-DE" sz="2800" dirty="0"/>
           </a:p>
@@ -12821,128 +13901,6 @@
     <p:extLst>
       <p:ext uri="{BB962C8B-B14F-4D97-AF65-F5344CB8AC3E}">
         <p14:creationId xmlns:p14="http://schemas.microsoft.com/office/powerpoint/2010/main" val="186723577"/>
-      </p:ext>
-    </p:extLst>
-  </p:cSld>
-  <p:clrMapOvr>
-    <a:masterClrMapping/>
-  </p:clrMapOvr>
-</p:sld>
-</file>
-
-<file path=ppt/slides/slide9.xml><?xml version="1.0" encoding="utf-8"?>
-<p:sld xmlns:a="http://schemas.openxmlformats.org/drawingml/2006/main" xmlns:r="http://schemas.openxmlformats.org/officeDocument/2006/relationships" xmlns:p="http://schemas.openxmlformats.org/presentationml/2006/main">
-  <p:cSld>
-    <p:spTree>
-      <p:nvGrpSpPr>
-        <p:cNvPr id="1" name=""/>
-        <p:cNvGrpSpPr/>
-        <p:nvPr/>
-      </p:nvGrpSpPr>
-      <p:grpSpPr>
-        <a:xfrm>
-          <a:off x="0" y="0"/>
-          <a:ext cx="0" cy="0"/>
-          <a:chOff x="0" y="0"/>
-          <a:chExt cx="0" cy="0"/>
-        </a:xfrm>
-      </p:grpSpPr>
-      <p:sp>
-        <p:nvSpPr>
-          <p:cNvPr id="2" name="Titel 1">
-            <a:extLst>
-              <a:ext uri="{FF2B5EF4-FFF2-40B4-BE49-F238E27FC236}">
-                <a16:creationId xmlns:a16="http://schemas.microsoft.com/office/drawing/2014/main" id="{7290E42A-69C7-4A22-8F14-E6BE7ADEE31D}"/>
-              </a:ext>
-            </a:extLst>
-          </p:cNvPr>
-          <p:cNvSpPr>
-            <a:spLocks noGrp="1"/>
-          </p:cNvSpPr>
-          <p:nvPr>
-            <p:ph type="title"/>
-          </p:nvPr>
-        </p:nvSpPr>
-        <p:spPr/>
-        <p:txBody>
-          <a:bodyPr/>
-          <a:lstStyle/>
-          <a:p>
-            <a:r>
-              <a:rPr lang="de-DE" dirty="0"/>
-              <a:t>Authentication</a:t>
-            </a:r>
-          </a:p>
-        </p:txBody>
-      </p:sp>
-      <p:pic>
-        <p:nvPicPr>
-          <p:cNvPr id="6" name="Inhaltsplatzhalter 5" descr="Ein Bild, das Licht enthält.&#10;&#10;Automatisch generierte Beschreibung">
-            <a:extLst>
-              <a:ext uri="{FF2B5EF4-FFF2-40B4-BE49-F238E27FC236}">
-                <a16:creationId xmlns:a16="http://schemas.microsoft.com/office/drawing/2014/main" id="{8F3FE626-347C-4297-AC93-EA8A0BC5026C}"/>
-              </a:ext>
-            </a:extLst>
-          </p:cNvPr>
-          <p:cNvPicPr>
-            <a:picLocks noGrp="1" noChangeAspect="1"/>
-          </p:cNvPicPr>
-          <p:nvPr>
-            <p:ph idx="1"/>
-          </p:nvPr>
-        </p:nvPicPr>
-        <p:blipFill>
-          <a:blip r:embed="rId3">
-            <a:extLst>
-              <a:ext uri="{28A0092B-C50C-407E-A947-70E740481C1C}">
-                <a14:useLocalDpi xmlns:a14="http://schemas.microsoft.com/office/drawing/2010/main" val="0"/>
-              </a:ext>
-            </a:extLst>
-          </a:blip>
-          <a:stretch>
-            <a:fillRect/>
-          </a:stretch>
-        </p:blipFill>
-        <p:spPr>
-          <a:xfrm>
-            <a:off x="2475865" y="1974149"/>
-            <a:ext cx="7240270" cy="4098266"/>
-          </a:xfrm>
-        </p:spPr>
-      </p:pic>
-      <p:sp>
-        <p:nvSpPr>
-          <p:cNvPr id="4" name="Foliennummernplatzhalter 3">
-            <a:extLst>
-              <a:ext uri="{FF2B5EF4-FFF2-40B4-BE49-F238E27FC236}">
-                <a16:creationId xmlns:a16="http://schemas.microsoft.com/office/drawing/2014/main" id="{59DAD071-9C07-4592-91EB-7BE35ACEF0E5}"/>
-              </a:ext>
-            </a:extLst>
-          </p:cNvPr>
-          <p:cNvSpPr>
-            <a:spLocks noGrp="1"/>
-          </p:cNvSpPr>
-          <p:nvPr>
-            <p:ph type="sldNum" sz="quarter" idx="12"/>
-          </p:nvPr>
-        </p:nvSpPr>
-        <p:spPr/>
-        <p:txBody>
-          <a:bodyPr/>
-          <a:lstStyle/>
-          <a:p>
-            <a:fld id="{D8C4CF5F-7A5F-4ACB-87CC-3EAB525DB293}" type="slidenum">
-              <a:rPr lang="de-DE" sz="2800" smtClean="0"/>
-              <a:t>9</a:t>
-            </a:fld>
-            <a:endParaRPr lang="de-DE" sz="2800" dirty="0"/>
-          </a:p>
-        </p:txBody>
-      </p:sp>
-    </p:spTree>
-    <p:extLst>
-      <p:ext uri="{BB962C8B-B14F-4D97-AF65-F5344CB8AC3E}">
-        <p14:creationId xmlns:p14="http://schemas.microsoft.com/office/powerpoint/2010/main" val="576598792"/>
       </p:ext>
     </p:extLst>
   </p:cSld>

</xml_diff>